<commit_message>
this power point introduces practical 1 (in R)
</commit_message>
<xml_diff>
--- a/3_Introduction_Bayesian_Modelling/practical_nb.1.pptx
+++ b/3_Introduction_Bayesian_Modelling/practical_nb.1.pptx
@@ -5,21 +5,25 @@
     <p:sldMasterId id="2147483720" r:id="rId1"/>
   </p:sldMasterIdLst>
   <p:notesMasterIdLst>
-    <p:notesMasterId r:id="rId11"/>
+    <p:notesMasterId r:id="rId15"/>
   </p:notesMasterIdLst>
   <p:handoutMasterIdLst>
-    <p:handoutMasterId r:id="rId12"/>
+    <p:handoutMasterId r:id="rId16"/>
   </p:handoutMasterIdLst>
   <p:sldIdLst>
     <p:sldId id="256" r:id="rId2"/>
-    <p:sldId id="268" r:id="rId3"/>
-    <p:sldId id="262" r:id="rId4"/>
-    <p:sldId id="263" r:id="rId5"/>
-    <p:sldId id="257" r:id="rId6"/>
-    <p:sldId id="259" r:id="rId7"/>
-    <p:sldId id="266" r:id="rId8"/>
-    <p:sldId id="267" r:id="rId9"/>
-    <p:sldId id="260" r:id="rId10"/>
+    <p:sldId id="270" r:id="rId3"/>
+    <p:sldId id="271" r:id="rId4"/>
+    <p:sldId id="268" r:id="rId5"/>
+    <p:sldId id="262" r:id="rId6"/>
+    <p:sldId id="263" r:id="rId7"/>
+    <p:sldId id="272" r:id="rId8"/>
+    <p:sldId id="273" r:id="rId9"/>
+    <p:sldId id="257" r:id="rId10"/>
+    <p:sldId id="259" r:id="rId11"/>
+    <p:sldId id="266" r:id="rId12"/>
+    <p:sldId id="267" r:id="rId13"/>
+    <p:sldId id="260" r:id="rId14"/>
   </p:sldIdLst>
   <p:sldSz cx="12192000" cy="6858000"/>
   <p:notesSz cx="6808788" cy="9940925"/>
@@ -222,7 +226,7 @@
           <a:p>
             <a:fld id="{5FE76A8D-6818-4CE5-9368-4201018A8022}" type="datetimeFigureOut">
               <a:rPr lang="en-GB" smtClean="0"/>
-              <a:t>02/10/2019</a:t>
+              <a:t>28/10/2019</a:t>
             </a:fld>
             <a:endParaRPr lang="en-GB"/>
           </a:p>
@@ -387,7 +391,7 @@
           <a:p>
             <a:fld id="{A56F8E16-3A47-4AEB-A00D-1E40630641A6}" type="datetimeFigureOut">
               <a:rPr lang="en-GB" smtClean="0"/>
-              <a:t>02/10/2019</a:t>
+              <a:t>28/10/2019</a:t>
             </a:fld>
             <a:endParaRPr lang="en-GB"/>
           </a:p>
@@ -870,7 +874,7 @@
           <a:p>
             <a:fld id="{12331A29-518D-4130-95F6-B7F2B4F46381}" type="datetime1">
               <a:rPr lang="en-GB" smtClean="0"/>
-              <a:t>02/10/2019</a:t>
+              <a:t>28/10/2019</a:t>
             </a:fld>
             <a:endParaRPr lang="en-GB"/>
           </a:p>
@@ -1040,7 +1044,7 @@
           <a:p>
             <a:fld id="{8B47C4EE-0E95-4311-BDF2-00A14419040A}" type="datetime1">
               <a:rPr lang="en-GB" smtClean="0"/>
-              <a:t>02/10/2019</a:t>
+              <a:t>28/10/2019</a:t>
             </a:fld>
             <a:endParaRPr lang="en-GB"/>
           </a:p>
@@ -1220,7 +1224,7 @@
           <a:p>
             <a:fld id="{F2922F02-2DFD-4FBD-97F8-65A5D1A74934}" type="datetime1">
               <a:rPr lang="en-GB" smtClean="0"/>
-              <a:t>02/10/2019</a:t>
+              <a:t>28/10/2019</a:t>
             </a:fld>
             <a:endParaRPr lang="en-GB"/>
           </a:p>
@@ -1390,7 +1394,7 @@
           <a:p>
             <a:fld id="{99BE48FD-4377-45EE-84F9-02193684BCB8}" type="datetime1">
               <a:rPr lang="en-GB" smtClean="0"/>
-              <a:t>02/10/2019</a:t>
+              <a:t>28/10/2019</a:t>
             </a:fld>
             <a:endParaRPr lang="en-GB"/>
           </a:p>
@@ -1636,7 +1640,7 @@
           <a:p>
             <a:fld id="{49839468-93D8-40FF-8F9D-F2D7CACFBC0C}" type="datetime1">
               <a:rPr lang="en-GB" smtClean="0"/>
-              <a:t>02/10/2019</a:t>
+              <a:t>28/10/2019</a:t>
             </a:fld>
             <a:endParaRPr lang="en-GB"/>
           </a:p>
@@ -1868,7 +1872,7 @@
           <a:p>
             <a:fld id="{EB322D6E-94DE-4BCD-A94F-B40CD46727BF}" type="datetime1">
               <a:rPr lang="en-GB" smtClean="0"/>
-              <a:t>02/10/2019</a:t>
+              <a:t>28/10/2019</a:t>
             </a:fld>
             <a:endParaRPr lang="en-GB"/>
           </a:p>
@@ -2235,7 +2239,7 @@
           <a:p>
             <a:fld id="{DC7E050C-C9CB-452C-9A06-94979BDFC19C}" type="datetime1">
               <a:rPr lang="en-GB" smtClean="0"/>
-              <a:t>02/10/2019</a:t>
+              <a:t>28/10/2019</a:t>
             </a:fld>
             <a:endParaRPr lang="en-GB"/>
           </a:p>
@@ -2353,7 +2357,7 @@
           <a:p>
             <a:fld id="{ADA5D233-B121-49BF-9AC7-45B2BE5DAE3C}" type="datetime1">
               <a:rPr lang="en-GB" smtClean="0"/>
-              <a:t>02/10/2019</a:t>
+              <a:t>28/10/2019</a:t>
             </a:fld>
             <a:endParaRPr lang="en-GB"/>
           </a:p>
@@ -2448,7 +2452,7 @@
           <a:p>
             <a:fld id="{8DDE3F52-B176-4550-B929-C06DBE867EDB}" type="datetime1">
               <a:rPr lang="en-GB" smtClean="0"/>
-              <a:t>02/10/2019</a:t>
+              <a:t>28/10/2019</a:t>
             </a:fld>
             <a:endParaRPr lang="en-GB"/>
           </a:p>
@@ -2725,7 +2729,7 @@
           <a:p>
             <a:fld id="{03C79D98-6537-4832-96AE-8ED867C8237C}" type="datetime1">
               <a:rPr lang="en-GB" smtClean="0"/>
-              <a:t>02/10/2019</a:t>
+              <a:t>28/10/2019</a:t>
             </a:fld>
             <a:endParaRPr lang="en-GB"/>
           </a:p>
@@ -2982,7 +2986,7 @@
           <a:p>
             <a:fld id="{199604BD-B5DB-40A0-8BB4-F247ABEB5732}" type="datetime1">
               <a:rPr lang="en-GB" smtClean="0"/>
-              <a:t>02/10/2019</a:t>
+              <a:t>28/10/2019</a:t>
             </a:fld>
             <a:endParaRPr lang="en-GB"/>
           </a:p>
@@ -3195,7 +3199,7 @@
           <a:p>
             <a:fld id="{AC7DB652-FFA0-48D9-8453-26684E5A5FBF}" type="datetime1">
               <a:rPr lang="en-GB" smtClean="0"/>
-              <a:t>02/10/2019</a:t>
+              <a:t>28/10/2019</a:t>
             </a:fld>
             <a:endParaRPr lang="en-GB"/>
           </a:p>
@@ -3620,7 +3624,6 @@
               <a:rPr lang="en-GB" dirty="0"/>
               <a:t>Practical 1: Understanding the posterior distribution</a:t>
             </a:r>
-            <a:endParaRPr lang="en-GB" dirty="0"/>
           </a:p>
         </p:txBody>
       </p:sp>
@@ -3793,6 +3796,773 @@
 </p:sld>
 </file>
 
+<file path=ppt/slides/slide10.xml><?xml version="1.0" encoding="utf-8"?>
+<p:sld xmlns:a="http://schemas.openxmlformats.org/drawingml/2006/main" xmlns:r="http://schemas.openxmlformats.org/officeDocument/2006/relationships" xmlns:p="http://schemas.openxmlformats.org/presentationml/2006/main">
+  <p:cSld>
+    <p:spTree>
+      <p:nvGrpSpPr>
+        <p:cNvPr id="1" name=""/>
+        <p:cNvGrpSpPr/>
+        <p:nvPr/>
+      </p:nvGrpSpPr>
+      <p:grpSpPr>
+        <a:xfrm>
+          <a:off x="0" y="0"/>
+          <a:ext cx="0" cy="0"/>
+          <a:chOff x="0" y="0"/>
+          <a:chExt cx="0" cy="0"/>
+        </a:xfrm>
+      </p:grpSpPr>
+      <p:sp>
+        <p:nvSpPr>
+          <p:cNvPr id="4" name="Footer Placeholder 3"/>
+          <p:cNvSpPr>
+            <a:spLocks noGrp="1"/>
+          </p:cNvSpPr>
+          <p:nvPr>
+            <p:ph type="ftr" sz="quarter" idx="11"/>
+          </p:nvPr>
+        </p:nvSpPr>
+        <p:spPr/>
+        <p:txBody>
+          <a:bodyPr/>
+          <a:lstStyle/>
+          <a:p>
+            <a:endParaRPr lang="en-GB"/>
+          </a:p>
+        </p:txBody>
+      </p:sp>
+      <p:sp>
+        <p:nvSpPr>
+          <p:cNvPr id="5" name="Slide Number Placeholder 4"/>
+          <p:cNvSpPr>
+            <a:spLocks noGrp="1"/>
+          </p:cNvSpPr>
+          <p:nvPr>
+            <p:ph type="sldNum" sz="quarter" idx="12"/>
+          </p:nvPr>
+        </p:nvSpPr>
+        <p:spPr/>
+        <p:txBody>
+          <a:bodyPr/>
+          <a:lstStyle/>
+          <a:p>
+            <a:fld id="{19D60E1B-DCEA-4626-AAA8-893A8BABE5ED}" type="slidenum">
+              <a:rPr lang="en-GB" smtClean="0"/>
+              <a:t>10</a:t>
+            </a:fld>
+            <a:endParaRPr lang="en-GB"/>
+          </a:p>
+        </p:txBody>
+      </p:sp>
+      <p:pic>
+        <p:nvPicPr>
+          <p:cNvPr id="2052" name="Picture 4" descr="Binomial Distribution Formula"/>
+          <p:cNvPicPr>
+            <a:picLocks noChangeAspect="1" noChangeArrowheads="1"/>
+          </p:cNvPicPr>
+          <p:nvPr/>
+        </p:nvPicPr>
+        <p:blipFill>
+          <a:blip r:embed="rId2">
+            <a:extLst>
+              <a:ext uri="{28A0092B-C50C-407E-A947-70E740481C1C}">
+                <a14:useLocalDpi xmlns:a14="http://schemas.microsoft.com/office/drawing/2010/main" val="0"/>
+              </a:ext>
+            </a:extLst>
+          </a:blip>
+          <a:srcRect/>
+          <a:stretch>
+            <a:fillRect/>
+          </a:stretch>
+        </p:blipFill>
+        <p:spPr bwMode="auto">
+          <a:xfrm>
+            <a:off x="1410733" y="255163"/>
+            <a:ext cx="9370534" cy="6466312"/>
+          </a:xfrm>
+          <a:prstGeom prst="rect">
+            <a:avLst/>
+          </a:prstGeom>
+          <a:noFill/>
+          <a:extLst>
+            <a:ext uri="{909E8E84-426E-40DD-AFC4-6F175D3DCCD1}">
+              <a14:hiddenFill xmlns:a14="http://schemas.microsoft.com/office/drawing/2010/main">
+                <a:solidFill>
+                  <a:srgbClr val="FFFFFF"/>
+                </a:solidFill>
+              </a14:hiddenFill>
+            </a:ext>
+          </a:extLst>
+        </p:spPr>
+      </p:pic>
+      <p:sp>
+        <p:nvSpPr>
+          <p:cNvPr id="8" name="TextBox 7"/>
+          <p:cNvSpPr txBox="1"/>
+          <p:nvPr/>
+        </p:nvSpPr>
+        <p:spPr>
+          <a:xfrm>
+            <a:off x="8953500" y="5353050"/>
+            <a:ext cx="1561005" cy="369332"/>
+          </a:xfrm>
+          <a:prstGeom prst="rect">
+            <a:avLst/>
+          </a:prstGeom>
+          <a:solidFill>
+            <a:schemeClr val="accent2"/>
+          </a:solidFill>
+        </p:spPr>
+        <p:txBody>
+          <a:bodyPr wrap="none" rtlCol="0">
+            <a:spAutoFit/>
+          </a:bodyPr>
+          <a:lstStyle/>
+          <a:p>
+            <a:r>
+              <a:rPr lang="en-GB" dirty="0" err="1" smtClean="0"/>
+              <a:t>Prob</a:t>
+            </a:r>
+            <a:r>
+              <a:rPr lang="en-GB" dirty="0" smtClean="0"/>
+              <a:t> (“water”)</a:t>
+            </a:r>
+            <a:endParaRPr lang="en-GB" dirty="0"/>
+          </a:p>
+        </p:txBody>
+      </p:sp>
+      <p:sp>
+        <p:nvSpPr>
+          <p:cNvPr id="11" name="TextBox 10"/>
+          <p:cNvSpPr txBox="1"/>
+          <p:nvPr/>
+        </p:nvSpPr>
+        <p:spPr>
+          <a:xfrm>
+            <a:off x="7318020" y="4908034"/>
+            <a:ext cx="4831964" cy="369332"/>
+          </a:xfrm>
+          <a:prstGeom prst="rect">
+            <a:avLst/>
+          </a:prstGeom>
+          <a:solidFill>
+            <a:schemeClr val="accent2"/>
+          </a:solidFill>
+        </p:spPr>
+        <p:txBody>
+          <a:bodyPr wrap="none" rtlCol="0">
+            <a:spAutoFit/>
+          </a:bodyPr>
+          <a:lstStyle/>
+          <a:p>
+            <a:r>
+              <a:rPr lang="en-GB" dirty="0" smtClean="0"/>
+              <a:t>Count of (“water”) follows a Binomial distribution</a:t>
+            </a:r>
+            <a:endParaRPr lang="en-GB" dirty="0"/>
+          </a:p>
+        </p:txBody>
+      </p:sp>
+      <p:sp>
+        <p:nvSpPr>
+          <p:cNvPr id="12" name="TextBox 11"/>
+          <p:cNvSpPr txBox="1"/>
+          <p:nvPr/>
+        </p:nvSpPr>
+        <p:spPr>
+          <a:xfrm>
+            <a:off x="10388151" y="4441567"/>
+            <a:ext cx="1591461" cy="369332"/>
+          </a:xfrm>
+          <a:prstGeom prst="rect">
+            <a:avLst/>
+          </a:prstGeom>
+          <a:solidFill>
+            <a:schemeClr val="accent2"/>
+          </a:solidFill>
+        </p:spPr>
+        <p:txBody>
+          <a:bodyPr wrap="none" rtlCol="0">
+            <a:spAutoFit/>
+          </a:bodyPr>
+          <a:lstStyle/>
+          <a:p>
+            <a:r>
+              <a:rPr lang="en-GB" dirty="0" smtClean="0"/>
+              <a:t>Number tosses</a:t>
+            </a:r>
+            <a:endParaRPr lang="en-GB" dirty="0"/>
+          </a:p>
+        </p:txBody>
+      </p:sp>
+      <p:sp>
+        <p:nvSpPr>
+          <p:cNvPr id="13" name="TextBox 12"/>
+          <p:cNvSpPr txBox="1"/>
+          <p:nvPr/>
+        </p:nvSpPr>
+        <p:spPr>
+          <a:xfrm>
+            <a:off x="10456253" y="5835650"/>
+            <a:ext cx="1416863" cy="369332"/>
+          </a:xfrm>
+          <a:prstGeom prst="rect">
+            <a:avLst/>
+          </a:prstGeom>
+          <a:solidFill>
+            <a:schemeClr val="accent2"/>
+          </a:solidFill>
+        </p:spPr>
+        <p:txBody>
+          <a:bodyPr wrap="none" rtlCol="0">
+            <a:spAutoFit/>
+          </a:bodyPr>
+          <a:lstStyle/>
+          <a:p>
+            <a:r>
+              <a:rPr lang="en-GB" dirty="0" err="1" smtClean="0"/>
+              <a:t>Prob</a:t>
+            </a:r>
+            <a:r>
+              <a:rPr lang="en-GB" dirty="0" smtClean="0"/>
+              <a:t> (“land”)</a:t>
+            </a:r>
+            <a:endParaRPr lang="en-GB" dirty="0"/>
+          </a:p>
+        </p:txBody>
+      </p:sp>
+    </p:spTree>
+    <p:extLst>
+      <p:ext uri="{BB962C8B-B14F-4D97-AF65-F5344CB8AC3E}">
+        <p14:creationId xmlns:p14="http://schemas.microsoft.com/office/powerpoint/2010/main" val="1061651623"/>
+      </p:ext>
+    </p:extLst>
+  </p:cSld>
+  <p:clrMapOvr>
+    <a:masterClrMapping/>
+  </p:clrMapOvr>
+</p:sld>
+</file>
+
+<file path=ppt/slides/slide11.xml><?xml version="1.0" encoding="utf-8"?>
+<p:sld xmlns:a="http://schemas.openxmlformats.org/drawingml/2006/main" xmlns:r="http://schemas.openxmlformats.org/officeDocument/2006/relationships" xmlns:p="http://schemas.openxmlformats.org/presentationml/2006/main">
+  <p:cSld>
+    <p:spTree>
+      <p:nvGrpSpPr>
+        <p:cNvPr id="1" name=""/>
+        <p:cNvGrpSpPr/>
+        <p:nvPr/>
+      </p:nvGrpSpPr>
+      <p:grpSpPr>
+        <a:xfrm>
+          <a:off x="0" y="0"/>
+          <a:ext cx="0" cy="0"/>
+          <a:chOff x="0" y="0"/>
+          <a:chExt cx="0" cy="0"/>
+        </a:xfrm>
+      </p:grpSpPr>
+      <p:sp>
+        <p:nvSpPr>
+          <p:cNvPr id="4" name="Footer Placeholder 3"/>
+          <p:cNvSpPr>
+            <a:spLocks noGrp="1"/>
+          </p:cNvSpPr>
+          <p:nvPr>
+            <p:ph type="ftr" sz="quarter" idx="11"/>
+          </p:nvPr>
+        </p:nvSpPr>
+        <p:spPr/>
+        <p:txBody>
+          <a:bodyPr/>
+          <a:lstStyle/>
+          <a:p>
+            <a:endParaRPr lang="en-GB"/>
+          </a:p>
+        </p:txBody>
+      </p:sp>
+      <p:sp>
+        <p:nvSpPr>
+          <p:cNvPr id="5" name="Slide Number Placeholder 4"/>
+          <p:cNvSpPr>
+            <a:spLocks noGrp="1"/>
+          </p:cNvSpPr>
+          <p:nvPr>
+            <p:ph type="sldNum" sz="quarter" idx="12"/>
+          </p:nvPr>
+        </p:nvSpPr>
+        <p:spPr/>
+        <p:txBody>
+          <a:bodyPr/>
+          <a:lstStyle/>
+          <a:p>
+            <a:fld id="{19D60E1B-DCEA-4626-AAA8-893A8BABE5ED}" type="slidenum">
+              <a:rPr lang="en-GB" smtClean="0"/>
+              <a:t>11</a:t>
+            </a:fld>
+            <a:endParaRPr lang="en-GB"/>
+          </a:p>
+        </p:txBody>
+      </p:sp>
+      <p:pic>
+        <p:nvPicPr>
+          <p:cNvPr id="7" name="Picture 6"/>
+          <p:cNvPicPr>
+            <a:picLocks noChangeAspect="1"/>
+          </p:cNvPicPr>
+          <p:nvPr/>
+        </p:nvPicPr>
+        <p:blipFill rotWithShape="1">
+          <a:blip r:embed="rId2">
+            <a:extLst>
+              <a:ext uri="{BEBA8EAE-BF5A-486C-A8C5-ECC9F3942E4B}">
+                <a14:imgProps xmlns:a14="http://schemas.microsoft.com/office/drawing/2010/main">
+                  <a14:imgLayer r:embed="rId3">
+                    <a14:imgEffect>
+                      <a14:brightnessContrast bright="20000" contrast="-20000"/>
+                    </a14:imgEffect>
+                  </a14:imgLayer>
+                </a14:imgProps>
+              </a:ext>
+            </a:extLst>
+          </a:blip>
+          <a:srcRect l="47579"/>
+          <a:stretch/>
+        </p:blipFill>
+        <p:spPr>
+          <a:xfrm rot="16200000">
+            <a:off x="1202084" y="-458441"/>
+            <a:ext cx="5907647" cy="8452184"/>
+          </a:xfrm>
+          <a:prstGeom prst="rect">
+            <a:avLst/>
+          </a:prstGeom>
+        </p:spPr>
+      </p:pic>
+      <p:sp>
+        <p:nvSpPr>
+          <p:cNvPr id="2" name="TextBox 1"/>
+          <p:cNvSpPr txBox="1"/>
+          <p:nvPr/>
+        </p:nvSpPr>
+        <p:spPr>
+          <a:xfrm>
+            <a:off x="754281" y="229052"/>
+            <a:ext cx="5341719" cy="584775"/>
+          </a:xfrm>
+          <a:prstGeom prst="rect">
+            <a:avLst/>
+          </a:prstGeom>
+          <a:noFill/>
+        </p:spPr>
+        <p:txBody>
+          <a:bodyPr wrap="none" rtlCol="0">
+            <a:spAutoFit/>
+          </a:bodyPr>
+          <a:lstStyle/>
+          <a:p>
+            <a:r>
+              <a:rPr lang="en-GB" sz="3200" dirty="0" smtClean="0"/>
+              <a:t>How a Bayesian model learns? </a:t>
+            </a:r>
+            <a:endParaRPr lang="en-GB" sz="3200" dirty="0"/>
+          </a:p>
+        </p:txBody>
+      </p:sp>
+      <p:sp>
+        <p:nvSpPr>
+          <p:cNvPr id="3" name="TextBox 2"/>
+          <p:cNvSpPr txBox="1"/>
+          <p:nvPr/>
+        </p:nvSpPr>
+        <p:spPr>
+          <a:xfrm>
+            <a:off x="8494295" y="3771027"/>
+            <a:ext cx="3442481" cy="2585323"/>
+          </a:xfrm>
+          <a:prstGeom prst="rect">
+            <a:avLst/>
+          </a:prstGeom>
+          <a:noFill/>
+        </p:spPr>
+        <p:txBody>
+          <a:bodyPr wrap="none" rtlCol="0">
+            <a:spAutoFit/>
+          </a:bodyPr>
+          <a:lstStyle/>
+          <a:p>
+            <a:r>
+              <a:rPr lang="en-GB" dirty="0" smtClean="0"/>
+              <a:t>Each toss of the globe produces</a:t>
+            </a:r>
+          </a:p>
+          <a:p>
+            <a:r>
+              <a:rPr lang="en-GB" dirty="0" smtClean="0"/>
+              <a:t>an observation (W or L).</a:t>
+            </a:r>
+          </a:p>
+          <a:p>
+            <a:endParaRPr lang="en-GB" dirty="0" smtClean="0"/>
+          </a:p>
+          <a:p>
+            <a:r>
+              <a:rPr lang="en-GB" dirty="0" smtClean="0"/>
+              <a:t>W: water</a:t>
+            </a:r>
+          </a:p>
+          <a:p>
+            <a:r>
+              <a:rPr lang="en-GB" dirty="0" smtClean="0"/>
+              <a:t>L: land</a:t>
+            </a:r>
+          </a:p>
+          <a:p>
+            <a:endParaRPr lang="en-GB" dirty="0"/>
+          </a:p>
+          <a:p>
+            <a:r>
+              <a:rPr lang="en-GB" dirty="0" smtClean="0"/>
+              <a:t>Solid curve: new plausibility</a:t>
+            </a:r>
+          </a:p>
+          <a:p>
+            <a:r>
+              <a:rPr lang="en-GB" dirty="0" smtClean="0"/>
+              <a:t>Dashed curve: previous plausibility</a:t>
+            </a:r>
+          </a:p>
+          <a:p>
+            <a:endParaRPr lang="en-GB" dirty="0"/>
+          </a:p>
+        </p:txBody>
+      </p:sp>
+      <p:cxnSp>
+        <p:nvCxnSpPr>
+          <p:cNvPr id="8" name="Straight Arrow Connector 7"/>
+          <p:cNvCxnSpPr/>
+          <p:nvPr/>
+        </p:nvCxnSpPr>
+        <p:spPr>
+          <a:xfrm flipH="1">
+            <a:off x="7112000" y="1930320"/>
+            <a:ext cx="1997041" cy="1358980"/>
+          </a:xfrm>
+          <a:prstGeom prst="straightConnector1">
+            <a:avLst/>
+          </a:prstGeom>
+          <a:ln>
+            <a:tailEnd type="triangle"/>
+          </a:ln>
+        </p:spPr>
+        <p:style>
+          <a:lnRef idx="1">
+            <a:schemeClr val="accent1"/>
+          </a:lnRef>
+          <a:fillRef idx="0">
+            <a:schemeClr val="accent1"/>
+          </a:fillRef>
+          <a:effectRef idx="0">
+            <a:schemeClr val="accent1"/>
+          </a:effectRef>
+          <a:fontRef idx="minor">
+            <a:schemeClr val="tx1"/>
+          </a:fontRef>
+        </p:style>
+      </p:cxnSp>
+      <p:sp>
+        <p:nvSpPr>
+          <p:cNvPr id="9" name="TextBox 8"/>
+          <p:cNvSpPr txBox="1"/>
+          <p:nvPr/>
+        </p:nvSpPr>
+        <p:spPr>
+          <a:xfrm>
+            <a:off x="9109041" y="1745654"/>
+            <a:ext cx="3082959" cy="369332"/>
+          </a:xfrm>
+          <a:prstGeom prst="rect">
+            <a:avLst/>
+          </a:prstGeom>
+          <a:noFill/>
+        </p:spPr>
+        <p:txBody>
+          <a:bodyPr wrap="square" rtlCol="0">
+            <a:spAutoFit/>
+          </a:bodyPr>
+          <a:lstStyle/>
+          <a:p>
+            <a:r>
+              <a:rPr lang="en-GB" dirty="0" smtClean="0"/>
+              <a:t>Proportion of “water” on earth</a:t>
+            </a:r>
+            <a:endParaRPr lang="en-GB" dirty="0"/>
+          </a:p>
+        </p:txBody>
+      </p:sp>
+    </p:spTree>
+    <p:extLst>
+      <p:ext uri="{BB962C8B-B14F-4D97-AF65-F5344CB8AC3E}">
+        <p14:creationId xmlns:p14="http://schemas.microsoft.com/office/powerpoint/2010/main" val="621405158"/>
+      </p:ext>
+    </p:extLst>
+  </p:cSld>
+  <p:clrMapOvr>
+    <a:masterClrMapping/>
+  </p:clrMapOvr>
+  <p:timing>
+    <p:tnLst>
+      <p:par>
+        <p:cTn id="1" dur="indefinite" restart="never" nodeType="tmRoot"/>
+      </p:par>
+    </p:tnLst>
+  </p:timing>
+</p:sld>
+</file>
+
+<file path=ppt/slides/slide12.xml><?xml version="1.0" encoding="utf-8"?>
+<p:sld xmlns:a="http://schemas.openxmlformats.org/drawingml/2006/main" xmlns:r="http://schemas.openxmlformats.org/officeDocument/2006/relationships" xmlns:p="http://schemas.openxmlformats.org/presentationml/2006/main">
+  <p:cSld>
+    <p:spTree>
+      <p:nvGrpSpPr>
+        <p:cNvPr id="1" name=""/>
+        <p:cNvGrpSpPr/>
+        <p:nvPr/>
+      </p:nvGrpSpPr>
+      <p:grpSpPr>
+        <a:xfrm>
+          <a:off x="0" y="0"/>
+          <a:ext cx="0" cy="0"/>
+          <a:chOff x="0" y="0"/>
+          <a:chExt cx="0" cy="0"/>
+        </a:xfrm>
+      </p:grpSpPr>
+      <p:sp>
+        <p:nvSpPr>
+          <p:cNvPr id="4" name="Footer Placeholder 3"/>
+          <p:cNvSpPr>
+            <a:spLocks noGrp="1"/>
+          </p:cNvSpPr>
+          <p:nvPr>
+            <p:ph type="ftr" sz="quarter" idx="11"/>
+          </p:nvPr>
+        </p:nvSpPr>
+        <p:spPr/>
+        <p:txBody>
+          <a:bodyPr/>
+          <a:lstStyle/>
+          <a:p>
+            <a:endParaRPr lang="en-GB"/>
+          </a:p>
+        </p:txBody>
+      </p:sp>
+      <p:sp>
+        <p:nvSpPr>
+          <p:cNvPr id="5" name="Slide Number Placeholder 4"/>
+          <p:cNvSpPr>
+            <a:spLocks noGrp="1"/>
+          </p:cNvSpPr>
+          <p:nvPr>
+            <p:ph type="sldNum" sz="quarter" idx="12"/>
+          </p:nvPr>
+        </p:nvSpPr>
+        <p:spPr/>
+        <p:txBody>
+          <a:bodyPr/>
+          <a:lstStyle/>
+          <a:p>
+            <a:fld id="{19D60E1B-DCEA-4626-AAA8-893A8BABE5ED}" type="slidenum">
+              <a:rPr lang="en-GB" smtClean="0"/>
+              <a:t>12</a:t>
+            </a:fld>
+            <a:endParaRPr lang="en-GB"/>
+          </a:p>
+        </p:txBody>
+      </p:sp>
+      <p:pic>
+        <p:nvPicPr>
+          <p:cNvPr id="6" name="Picture 5"/>
+          <p:cNvPicPr>
+            <a:picLocks noChangeAspect="1"/>
+          </p:cNvPicPr>
+          <p:nvPr/>
+        </p:nvPicPr>
+        <p:blipFill rotWithShape="1">
+          <a:blip r:embed="rId2">
+            <a:extLst>
+              <a:ext uri="{BEBA8EAE-BF5A-486C-A8C5-ECC9F3942E4B}">
+                <a14:imgProps xmlns:a14="http://schemas.microsoft.com/office/drawing/2010/main">
+                  <a14:imgLayer r:embed="rId3">
+                    <a14:imgEffect>
+                      <a14:brightnessContrast bright="20000" contrast="-20000"/>
+                    </a14:imgEffect>
+                  </a14:imgLayer>
+                </a14:imgProps>
+              </a:ext>
+            </a:extLst>
+          </a:blip>
+          <a:srcRect l="18342" r="52421"/>
+          <a:stretch/>
+        </p:blipFill>
+        <p:spPr>
+          <a:xfrm rot="16200000">
+            <a:off x="3522838" y="-1527417"/>
+            <a:ext cx="4096528" cy="10508622"/>
+          </a:xfrm>
+          <a:prstGeom prst="rect">
+            <a:avLst/>
+          </a:prstGeom>
+        </p:spPr>
+      </p:pic>
+    </p:spTree>
+    <p:extLst>
+      <p:ext uri="{BB962C8B-B14F-4D97-AF65-F5344CB8AC3E}">
+        <p14:creationId xmlns:p14="http://schemas.microsoft.com/office/powerpoint/2010/main" val="2608275580"/>
+      </p:ext>
+    </p:extLst>
+  </p:cSld>
+  <p:clrMapOvr>
+    <a:masterClrMapping/>
+  </p:clrMapOvr>
+</p:sld>
+</file>
+
+<file path=ppt/slides/slide13.xml><?xml version="1.0" encoding="utf-8"?>
+<p:sld xmlns:a="http://schemas.openxmlformats.org/drawingml/2006/main" xmlns:r="http://schemas.openxmlformats.org/officeDocument/2006/relationships" xmlns:p="http://schemas.openxmlformats.org/presentationml/2006/main">
+  <p:cSld>
+    <p:spTree>
+      <p:nvGrpSpPr>
+        <p:cNvPr id="1" name=""/>
+        <p:cNvGrpSpPr/>
+        <p:nvPr/>
+      </p:nvGrpSpPr>
+      <p:grpSpPr>
+        <a:xfrm>
+          <a:off x="0" y="0"/>
+          <a:ext cx="0" cy="0"/>
+          <a:chOff x="0" y="0"/>
+          <a:chExt cx="0" cy="0"/>
+        </a:xfrm>
+      </p:grpSpPr>
+      <p:sp>
+        <p:nvSpPr>
+          <p:cNvPr id="6" name="Title 5"/>
+          <p:cNvSpPr>
+            <a:spLocks noGrp="1"/>
+          </p:cNvSpPr>
+          <p:nvPr>
+            <p:ph type="title"/>
+          </p:nvPr>
+        </p:nvSpPr>
+        <p:spPr/>
+        <p:txBody>
+          <a:bodyPr/>
+          <a:lstStyle/>
+          <a:p>
+            <a:r>
+              <a:rPr lang="en-GB" dirty="0" smtClean="0"/>
+              <a:t>Practical</a:t>
+            </a:r>
+            <a:endParaRPr lang="en-GB" dirty="0"/>
+          </a:p>
+        </p:txBody>
+      </p:sp>
+      <p:sp>
+        <p:nvSpPr>
+          <p:cNvPr id="8" name="Content Placeholder 7"/>
+          <p:cNvSpPr>
+            <a:spLocks noGrp="1"/>
+          </p:cNvSpPr>
+          <p:nvPr>
+            <p:ph idx="1"/>
+          </p:nvPr>
+        </p:nvSpPr>
+        <p:spPr/>
+        <p:txBody>
+          <a:bodyPr/>
+          <a:lstStyle/>
+          <a:p>
+            <a:r>
+              <a:rPr lang="en-GB" dirty="0" smtClean="0"/>
+              <a:t>Start and complete the first R </a:t>
+            </a:r>
+            <a:r>
+              <a:rPr lang="en-GB" dirty="0" smtClean="0"/>
+              <a:t>practical (practical_nb.1.R)</a:t>
+            </a:r>
+            <a:endParaRPr lang="en-GB" dirty="0" smtClean="0"/>
+          </a:p>
+          <a:p>
+            <a:pPr marL="0" indent="0">
+              <a:buNone/>
+            </a:pPr>
+            <a:endParaRPr lang="en-GB" dirty="0"/>
+          </a:p>
+        </p:txBody>
+      </p:sp>
+      <p:sp>
+        <p:nvSpPr>
+          <p:cNvPr id="4" name="Footer Placeholder 3"/>
+          <p:cNvSpPr>
+            <a:spLocks noGrp="1"/>
+          </p:cNvSpPr>
+          <p:nvPr>
+            <p:ph type="ftr" sz="quarter" idx="11"/>
+          </p:nvPr>
+        </p:nvSpPr>
+        <p:spPr/>
+        <p:txBody>
+          <a:bodyPr/>
+          <a:lstStyle/>
+          <a:p>
+            <a:endParaRPr lang="en-GB"/>
+          </a:p>
+        </p:txBody>
+      </p:sp>
+      <p:sp>
+        <p:nvSpPr>
+          <p:cNvPr id="5" name="Slide Number Placeholder 4"/>
+          <p:cNvSpPr>
+            <a:spLocks noGrp="1"/>
+          </p:cNvSpPr>
+          <p:nvPr>
+            <p:ph type="sldNum" sz="quarter" idx="12"/>
+          </p:nvPr>
+        </p:nvSpPr>
+        <p:spPr/>
+        <p:txBody>
+          <a:bodyPr/>
+          <a:lstStyle/>
+          <a:p>
+            <a:fld id="{19D60E1B-DCEA-4626-AAA8-893A8BABE5ED}" type="slidenum">
+              <a:rPr lang="en-GB" smtClean="0"/>
+              <a:pPr/>
+              <a:t>13</a:t>
+            </a:fld>
+            <a:endParaRPr lang="en-GB"/>
+          </a:p>
+        </p:txBody>
+      </p:sp>
+    </p:spTree>
+    <p:extLst>
+      <p:ext uri="{BB962C8B-B14F-4D97-AF65-F5344CB8AC3E}">
+        <p14:creationId xmlns:p14="http://schemas.microsoft.com/office/powerpoint/2010/main" val="1187946936"/>
+      </p:ext>
+    </p:extLst>
+  </p:cSld>
+  <p:clrMapOvr>
+    <a:masterClrMapping/>
+  </p:clrMapOvr>
+  <p:timing>
+    <p:tnLst>
+      <p:par>
+        <p:cTn id="1" dur="indefinite" restart="never" nodeType="tmRoot"/>
+      </p:par>
+    </p:tnLst>
+  </p:timing>
+</p:sld>
+</file>
+
 <file path=ppt/slides/slide2.xml><?xml version="1.0" encoding="utf-8"?>
 <p:sld xmlns:a="http://schemas.openxmlformats.org/drawingml/2006/main" xmlns:r="http://schemas.openxmlformats.org/officeDocument/2006/relationships" xmlns:p="http://schemas.openxmlformats.org/presentationml/2006/main">
   <p:cSld>
@@ -3812,6 +4582,742 @@
       </p:grpSpPr>
       <p:sp>
         <p:nvSpPr>
+          <p:cNvPr id="2" name="Title 1"/>
+          <p:cNvSpPr>
+            <a:spLocks noGrp="1"/>
+          </p:cNvSpPr>
+          <p:nvPr>
+            <p:ph type="title"/>
+          </p:nvPr>
+        </p:nvSpPr>
+        <p:spPr/>
+        <p:txBody>
+          <a:bodyPr/>
+          <a:lstStyle/>
+          <a:p>
+            <a:r>
+              <a:rPr lang="en-GB" dirty="0" smtClean="0"/>
+              <a:t>Bayes’ theorem</a:t>
+            </a:r>
+            <a:endParaRPr lang="en-GB" dirty="0"/>
+          </a:p>
+        </p:txBody>
+      </p:sp>
+      <p:sp>
+        <p:nvSpPr>
+          <p:cNvPr id="4" name="Footer Placeholder 3"/>
+          <p:cNvSpPr>
+            <a:spLocks noGrp="1"/>
+          </p:cNvSpPr>
+          <p:nvPr>
+            <p:ph type="ftr" sz="quarter" idx="11"/>
+          </p:nvPr>
+        </p:nvSpPr>
+        <p:spPr/>
+        <p:txBody>
+          <a:bodyPr/>
+          <a:lstStyle/>
+          <a:p>
+            <a:endParaRPr lang="en-GB"/>
+          </a:p>
+        </p:txBody>
+      </p:sp>
+      <p:sp>
+        <p:nvSpPr>
+          <p:cNvPr id="5" name="Slide Number Placeholder 4"/>
+          <p:cNvSpPr>
+            <a:spLocks noGrp="1"/>
+          </p:cNvSpPr>
+          <p:nvPr>
+            <p:ph type="sldNum" sz="quarter" idx="12"/>
+          </p:nvPr>
+        </p:nvSpPr>
+        <p:spPr>
+          <a:xfrm>
+            <a:off x="9797714" y="6244473"/>
+            <a:ext cx="965200" cy="365125"/>
+          </a:xfrm>
+        </p:spPr>
+        <p:txBody>
+          <a:bodyPr/>
+          <a:lstStyle/>
+          <a:p>
+            <a:r>
+              <a:rPr lang="en-GB" dirty="0" smtClean="0"/>
+              <a:t>continuous</a:t>
+            </a:r>
+            <a:endParaRPr lang="en-GB" dirty="0"/>
+          </a:p>
+        </p:txBody>
+      </p:sp>
+      <p:pic>
+        <p:nvPicPr>
+          <p:cNvPr id="6" name="Picture 2" descr="https://bayesian.org/wp-content/uploads/2016/08/cropped-Bayes_Theorem_MMB_02.jpg"/>
+          <p:cNvPicPr>
+            <a:picLocks noChangeAspect="1" noChangeArrowheads="1"/>
+          </p:cNvPicPr>
+          <p:nvPr/>
+        </p:nvPicPr>
+        <p:blipFill>
+          <a:blip r:embed="rId2">
+            <a:extLst>
+              <a:ext uri="{28A0092B-C50C-407E-A947-70E740481C1C}">
+                <a14:useLocalDpi xmlns:a14="http://schemas.microsoft.com/office/drawing/2010/main" val="0"/>
+              </a:ext>
+            </a:extLst>
+          </a:blip>
+          <a:srcRect/>
+          <a:stretch>
+            <a:fillRect/>
+          </a:stretch>
+        </p:blipFill>
+        <p:spPr bwMode="auto">
+          <a:xfrm>
+            <a:off x="300037" y="1577172"/>
+            <a:ext cx="11591925" cy="3228975"/>
+          </a:xfrm>
+          <a:prstGeom prst="rect">
+            <a:avLst/>
+          </a:prstGeom>
+          <a:noFill/>
+          <a:extLst>
+            <a:ext uri="{909E8E84-426E-40DD-AFC4-6F175D3DCCD1}">
+              <a14:hiddenFill xmlns:a14="http://schemas.microsoft.com/office/drawing/2010/main">
+                <a:solidFill>
+                  <a:srgbClr val="FFFFFF"/>
+                </a:solidFill>
+              </a14:hiddenFill>
+            </a:ext>
+          </a:extLst>
+        </p:spPr>
+      </p:pic>
+      <p:sp>
+        <p:nvSpPr>
+          <p:cNvPr id="8" name="Oval 7"/>
+          <p:cNvSpPr/>
+          <p:nvPr/>
+        </p:nvSpPr>
+        <p:spPr>
+          <a:xfrm>
+            <a:off x="1588168" y="4844917"/>
+            <a:ext cx="1684421" cy="736331"/>
+          </a:xfrm>
+          <a:prstGeom prst="ellipse">
+            <a:avLst/>
+          </a:prstGeom>
+          <a:solidFill>
+            <a:schemeClr val="bg1"/>
+          </a:solidFill>
+          <a:ln>
+            <a:solidFill>
+              <a:schemeClr val="accent3"/>
+            </a:solidFill>
+          </a:ln>
+        </p:spPr>
+        <p:style>
+          <a:lnRef idx="2">
+            <a:schemeClr val="accent1">
+              <a:shade val="50000"/>
+            </a:schemeClr>
+          </a:lnRef>
+          <a:fillRef idx="1">
+            <a:schemeClr val="accent1"/>
+          </a:fillRef>
+          <a:effectRef idx="0">
+            <a:schemeClr val="accent1"/>
+          </a:effectRef>
+          <a:fontRef idx="minor">
+            <a:schemeClr val="lt1"/>
+          </a:fontRef>
+        </p:style>
+        <p:txBody>
+          <a:bodyPr rtlCol="0" anchor="ctr"/>
+          <a:lstStyle/>
+          <a:p>
+            <a:pPr algn="ctr"/>
+            <a:r>
+              <a:rPr lang="en-GB" dirty="0" smtClean="0">
+                <a:solidFill>
+                  <a:schemeClr val="tx1"/>
+                </a:solidFill>
+              </a:rPr>
+              <a:t>posterior</a:t>
+            </a:r>
+            <a:endParaRPr lang="en-GB" dirty="0">
+              <a:solidFill>
+                <a:schemeClr val="tx1"/>
+              </a:solidFill>
+            </a:endParaRPr>
+          </a:p>
+        </p:txBody>
+      </p:sp>
+      <p:sp>
+        <p:nvSpPr>
+          <p:cNvPr id="9" name="Oval 8"/>
+          <p:cNvSpPr/>
+          <p:nvPr/>
+        </p:nvSpPr>
+        <p:spPr>
+          <a:xfrm>
+            <a:off x="6095999" y="802070"/>
+            <a:ext cx="1684421" cy="736331"/>
+          </a:xfrm>
+          <a:prstGeom prst="ellipse">
+            <a:avLst/>
+          </a:prstGeom>
+          <a:solidFill>
+            <a:schemeClr val="bg1"/>
+          </a:solidFill>
+          <a:ln>
+            <a:solidFill>
+              <a:schemeClr val="accent3"/>
+            </a:solidFill>
+          </a:ln>
+        </p:spPr>
+        <p:style>
+          <a:lnRef idx="2">
+            <a:schemeClr val="accent1">
+              <a:shade val="50000"/>
+            </a:schemeClr>
+          </a:lnRef>
+          <a:fillRef idx="1">
+            <a:schemeClr val="accent1"/>
+          </a:fillRef>
+          <a:effectRef idx="0">
+            <a:schemeClr val="accent1"/>
+          </a:effectRef>
+          <a:fontRef idx="minor">
+            <a:schemeClr val="lt1"/>
+          </a:fontRef>
+        </p:style>
+        <p:txBody>
+          <a:bodyPr rtlCol="0" anchor="ctr"/>
+          <a:lstStyle/>
+          <a:p>
+            <a:pPr algn="ctr"/>
+            <a:r>
+              <a:rPr lang="en-GB" dirty="0" smtClean="0">
+                <a:solidFill>
+                  <a:schemeClr val="tx1"/>
+                </a:solidFill>
+              </a:rPr>
+              <a:t>likelihood</a:t>
+            </a:r>
+            <a:endParaRPr lang="en-GB" dirty="0">
+              <a:solidFill>
+                <a:schemeClr val="tx1"/>
+              </a:solidFill>
+            </a:endParaRPr>
+          </a:p>
+        </p:txBody>
+      </p:sp>
+      <p:sp>
+        <p:nvSpPr>
+          <p:cNvPr id="10" name="Oval 9"/>
+          <p:cNvSpPr/>
+          <p:nvPr/>
+        </p:nvSpPr>
+        <p:spPr>
+          <a:xfrm>
+            <a:off x="8955504" y="776637"/>
+            <a:ext cx="1684421" cy="736331"/>
+          </a:xfrm>
+          <a:prstGeom prst="ellipse">
+            <a:avLst/>
+          </a:prstGeom>
+          <a:solidFill>
+            <a:schemeClr val="bg1"/>
+          </a:solidFill>
+          <a:ln>
+            <a:solidFill>
+              <a:schemeClr val="accent3"/>
+            </a:solidFill>
+          </a:ln>
+        </p:spPr>
+        <p:style>
+          <a:lnRef idx="2">
+            <a:schemeClr val="accent1">
+              <a:shade val="50000"/>
+            </a:schemeClr>
+          </a:lnRef>
+          <a:fillRef idx="1">
+            <a:schemeClr val="accent1"/>
+          </a:fillRef>
+          <a:effectRef idx="0">
+            <a:schemeClr val="accent1"/>
+          </a:effectRef>
+          <a:fontRef idx="minor">
+            <a:schemeClr val="lt1"/>
+          </a:fontRef>
+        </p:style>
+        <p:txBody>
+          <a:bodyPr rtlCol="0" anchor="ctr"/>
+          <a:lstStyle/>
+          <a:p>
+            <a:pPr algn="ctr"/>
+            <a:r>
+              <a:rPr lang="en-GB" dirty="0" smtClean="0">
+                <a:solidFill>
+                  <a:schemeClr val="tx1"/>
+                </a:solidFill>
+              </a:rPr>
+              <a:t>prior</a:t>
+            </a:r>
+            <a:endParaRPr lang="en-GB" dirty="0">
+              <a:solidFill>
+                <a:schemeClr val="tx1"/>
+              </a:solidFill>
+            </a:endParaRPr>
+          </a:p>
+        </p:txBody>
+      </p:sp>
+      <p:sp>
+        <p:nvSpPr>
+          <p:cNvPr id="11" name="Oval 10"/>
+          <p:cNvSpPr/>
+          <p:nvPr/>
+        </p:nvSpPr>
+        <p:spPr>
+          <a:xfrm>
+            <a:off x="7599947" y="4844917"/>
+            <a:ext cx="1684421" cy="736331"/>
+          </a:xfrm>
+          <a:prstGeom prst="ellipse">
+            <a:avLst/>
+          </a:prstGeom>
+          <a:solidFill>
+            <a:schemeClr val="bg1"/>
+          </a:solidFill>
+          <a:ln>
+            <a:solidFill>
+              <a:schemeClr val="accent3"/>
+            </a:solidFill>
+          </a:ln>
+        </p:spPr>
+        <p:style>
+          <a:lnRef idx="2">
+            <a:schemeClr val="accent1">
+              <a:shade val="50000"/>
+            </a:schemeClr>
+          </a:lnRef>
+          <a:fillRef idx="1">
+            <a:schemeClr val="accent1"/>
+          </a:fillRef>
+          <a:effectRef idx="0">
+            <a:schemeClr val="accent1"/>
+          </a:effectRef>
+          <a:fontRef idx="minor">
+            <a:schemeClr val="lt1"/>
+          </a:fontRef>
+        </p:style>
+        <p:txBody>
+          <a:bodyPr rtlCol="0" anchor="ctr"/>
+          <a:lstStyle/>
+          <a:p>
+            <a:pPr algn="ctr"/>
+            <a:r>
+              <a:rPr lang="en-GB" dirty="0" smtClean="0">
+                <a:solidFill>
+                  <a:schemeClr val="tx1"/>
+                </a:solidFill>
+              </a:rPr>
+              <a:t>constant</a:t>
+            </a:r>
+            <a:endParaRPr lang="en-GB" dirty="0">
+              <a:solidFill>
+                <a:schemeClr val="tx1"/>
+              </a:solidFill>
+            </a:endParaRPr>
+          </a:p>
+        </p:txBody>
+      </p:sp>
+      <p:cxnSp>
+        <p:nvCxnSpPr>
+          <p:cNvPr id="13" name="Straight Arrow Connector 12"/>
+          <p:cNvCxnSpPr>
+            <a:endCxn id="11" idx="4"/>
+          </p:cNvCxnSpPr>
+          <p:nvPr/>
+        </p:nvCxnSpPr>
+        <p:spPr>
+          <a:xfrm flipH="1" flipV="1">
+            <a:off x="8442158" y="5581248"/>
+            <a:ext cx="513346" cy="326257"/>
+          </a:xfrm>
+          <a:prstGeom prst="straightConnector1">
+            <a:avLst/>
+          </a:prstGeom>
+          <a:ln>
+            <a:tailEnd type="triangle"/>
+          </a:ln>
+        </p:spPr>
+        <p:style>
+          <a:lnRef idx="1">
+            <a:schemeClr val="accent1"/>
+          </a:lnRef>
+          <a:fillRef idx="0">
+            <a:schemeClr val="accent1"/>
+          </a:fillRef>
+          <a:effectRef idx="0">
+            <a:schemeClr val="accent1"/>
+          </a:effectRef>
+          <a:fontRef idx="minor">
+            <a:schemeClr val="tx1"/>
+          </a:fontRef>
+        </p:style>
+      </p:cxnSp>
+      <mc:AlternateContent xmlns:mc="http://schemas.openxmlformats.org/markup-compatibility/2006">
+        <mc:Choice xmlns:a14="http://schemas.microsoft.com/office/drawing/2010/main" Requires="a14">
+          <p:sp>
+            <p:nvSpPr>
+              <p:cNvPr id="15" name="TextBox 14"/>
+              <p:cNvSpPr txBox="1"/>
+              <p:nvPr/>
+            </p:nvSpPr>
+            <p:spPr>
+              <a:xfrm>
+                <a:off x="8698831" y="5889341"/>
+                <a:ext cx="3339632" cy="412164"/>
+              </a:xfrm>
+              <a:prstGeom prst="rect">
+                <a:avLst/>
+              </a:prstGeom>
+              <a:noFill/>
+            </p:spPr>
+            <p:txBody>
+              <a:bodyPr wrap="none" rtlCol="0">
+                <a:spAutoFit/>
+              </a:bodyPr>
+              <a:lstStyle/>
+              <a:p>
+                <a:r>
+                  <a:rPr lang="en-GB" dirty="0" smtClean="0"/>
+                  <a:t>P(B)=E[P(B|A)]=</a:t>
+                </a:r>
+                <a14:m>
+                  <m:oMath xmlns:m="http://schemas.openxmlformats.org/officeDocument/2006/math">
+                    <m:nary>
+                      <m:naryPr>
+                        <m:limLoc m:val="undOvr"/>
+                        <m:subHide m:val="on"/>
+                        <m:supHide m:val="on"/>
+                        <m:ctrlPr>
+                          <a:rPr lang="en-GB" i="1" smtClean="0">
+                            <a:latin typeface="Cambria Math" panose="02040503050406030204" pitchFamily="18" charset="0"/>
+                          </a:rPr>
+                        </m:ctrlPr>
+                      </m:naryPr>
+                      <m:sub/>
+                      <m:sup/>
+                      <m:e>
+                        <m:r>
+                          <a:rPr lang="en-GB" b="0" i="1" smtClean="0">
+                            <a:latin typeface="Cambria Math" panose="02040503050406030204" pitchFamily="18" charset="0"/>
+                          </a:rPr>
+                          <m:t>𝑃</m:t>
+                        </m:r>
+                        <m:d>
+                          <m:dPr>
+                            <m:ctrlPr>
+                              <a:rPr lang="en-GB" b="0" i="1" smtClean="0">
+                                <a:latin typeface="Cambria Math" panose="02040503050406030204" pitchFamily="18" charset="0"/>
+                              </a:rPr>
+                            </m:ctrlPr>
+                          </m:dPr>
+                          <m:e>
+                            <m:r>
+                              <a:rPr lang="en-GB" b="0" i="1" smtClean="0">
+                                <a:latin typeface="Cambria Math" panose="02040503050406030204" pitchFamily="18" charset="0"/>
+                              </a:rPr>
+                              <m:t>𝐵</m:t>
+                            </m:r>
+                          </m:e>
+                          <m:e>
+                            <m:r>
+                              <a:rPr lang="en-GB" b="0" i="1" smtClean="0">
+                                <a:latin typeface="Cambria Math" panose="02040503050406030204" pitchFamily="18" charset="0"/>
+                              </a:rPr>
+                              <m:t>𝐴</m:t>
+                            </m:r>
+                          </m:e>
+                        </m:d>
+                        <m:r>
+                          <a:rPr lang="en-GB" b="0" i="1" smtClean="0">
+                            <a:latin typeface="Cambria Math" panose="02040503050406030204" pitchFamily="18" charset="0"/>
+                          </a:rPr>
+                          <m:t>𝑃</m:t>
+                        </m:r>
+                        <m:d>
+                          <m:dPr>
+                            <m:ctrlPr>
+                              <a:rPr lang="en-GB" b="0" i="1" smtClean="0">
+                                <a:latin typeface="Cambria Math" panose="02040503050406030204" pitchFamily="18" charset="0"/>
+                              </a:rPr>
+                            </m:ctrlPr>
+                          </m:dPr>
+                          <m:e>
+                            <m:r>
+                              <a:rPr lang="en-GB" b="0" i="1" smtClean="0">
+                                <a:latin typeface="Cambria Math" panose="02040503050406030204" pitchFamily="18" charset="0"/>
+                              </a:rPr>
+                              <m:t>𝐴</m:t>
+                            </m:r>
+                          </m:e>
+                        </m:d>
+                        <m:r>
+                          <a:rPr lang="en-GB" b="0" i="1" smtClean="0">
+                            <a:latin typeface="Cambria Math" panose="02040503050406030204" pitchFamily="18" charset="0"/>
+                          </a:rPr>
+                          <m:t>𝑑𝐴</m:t>
+                        </m:r>
+                      </m:e>
+                    </m:nary>
+                  </m:oMath>
+                </a14:m>
+                <a:endParaRPr lang="en-GB" dirty="0"/>
+              </a:p>
+            </p:txBody>
+          </p:sp>
+        </mc:Choice>
+        <mc:Fallback>
+          <p:sp>
+            <p:nvSpPr>
+              <p:cNvPr id="15" name="TextBox 14"/>
+              <p:cNvSpPr txBox="1">
+                <a:spLocks noRot="1" noChangeAspect="1" noMove="1" noResize="1" noEditPoints="1" noAdjustHandles="1" noChangeArrowheads="1" noChangeShapeType="1" noTextEdit="1"/>
+              </p:cNvSpPr>
+              <p:nvPr/>
+            </p:nvSpPr>
+            <p:spPr>
+              <a:xfrm>
+                <a:off x="8698831" y="5889341"/>
+                <a:ext cx="3339632" cy="412164"/>
+              </a:xfrm>
+              <a:prstGeom prst="rect">
+                <a:avLst/>
+              </a:prstGeom>
+              <a:blipFill>
+                <a:blip r:embed="rId3"/>
+                <a:stretch>
+                  <a:fillRect l="-1642" t="-132353" b="-191176"/>
+                </a:stretch>
+              </a:blipFill>
+            </p:spPr>
+            <p:txBody>
+              <a:bodyPr/>
+              <a:lstStyle/>
+              <a:p>
+                <a:r>
+                  <a:rPr lang="en-GB">
+                    <a:noFill/>
+                  </a:rPr>
+                  <a:t> </a:t>
+                </a:r>
+              </a:p>
+            </p:txBody>
+          </p:sp>
+        </mc:Fallback>
+      </mc:AlternateContent>
+      <p:sp>
+        <p:nvSpPr>
+          <p:cNvPr id="16" name="TextBox 15"/>
+          <p:cNvSpPr txBox="1"/>
+          <p:nvPr/>
+        </p:nvSpPr>
+        <p:spPr>
+          <a:xfrm>
+            <a:off x="202678" y="5677499"/>
+            <a:ext cx="2574872" cy="1200329"/>
+          </a:xfrm>
+          <a:prstGeom prst="rect">
+            <a:avLst/>
+          </a:prstGeom>
+          <a:noFill/>
+        </p:spPr>
+        <p:txBody>
+          <a:bodyPr wrap="none" rtlCol="0">
+            <a:spAutoFit/>
+          </a:bodyPr>
+          <a:lstStyle/>
+          <a:p>
+            <a:r>
+              <a:rPr lang="en-GB" dirty="0" smtClean="0"/>
+              <a:t>A: parameters</a:t>
+            </a:r>
+          </a:p>
+          <a:p>
+            <a:r>
+              <a:rPr lang="en-GB" dirty="0" smtClean="0"/>
+              <a:t>B: data</a:t>
+            </a:r>
+          </a:p>
+          <a:p>
+            <a:r>
+              <a:rPr lang="en-GB" dirty="0" smtClean="0"/>
+              <a:t>E[ ]: expectation</a:t>
+            </a:r>
+          </a:p>
+          <a:p>
+            <a:r>
+              <a:rPr lang="en-GB" dirty="0" smtClean="0"/>
+              <a:t>P: probability distribution</a:t>
+            </a:r>
+            <a:endParaRPr lang="en-GB" dirty="0"/>
+          </a:p>
+        </p:txBody>
+      </p:sp>
+      <p:cxnSp>
+        <p:nvCxnSpPr>
+          <p:cNvPr id="17" name="Straight Arrow Connector 16"/>
+          <p:cNvCxnSpPr/>
+          <p:nvPr/>
+        </p:nvCxnSpPr>
+        <p:spPr>
+          <a:xfrm flipH="1" flipV="1">
+            <a:off x="10238875" y="6157452"/>
+            <a:ext cx="3675" cy="198898"/>
+          </a:xfrm>
+          <a:prstGeom prst="straightConnector1">
+            <a:avLst/>
+          </a:prstGeom>
+          <a:ln>
+            <a:tailEnd type="triangle"/>
+          </a:ln>
+        </p:spPr>
+        <p:style>
+          <a:lnRef idx="1">
+            <a:schemeClr val="accent1"/>
+          </a:lnRef>
+          <a:fillRef idx="0">
+            <a:schemeClr val="accent1"/>
+          </a:fillRef>
+          <a:effectRef idx="0">
+            <a:schemeClr val="accent1"/>
+          </a:effectRef>
+          <a:fontRef idx="minor">
+            <a:schemeClr val="tx1"/>
+          </a:fontRef>
+        </p:style>
+      </p:cxnSp>
+    </p:spTree>
+    <p:extLst>
+      <p:ext uri="{BB962C8B-B14F-4D97-AF65-F5344CB8AC3E}">
+        <p14:creationId xmlns:p14="http://schemas.microsoft.com/office/powerpoint/2010/main" val="4164236967"/>
+      </p:ext>
+    </p:extLst>
+  </p:cSld>
+  <p:clrMapOvr>
+    <a:masterClrMapping/>
+  </p:clrMapOvr>
+</p:sld>
+</file>
+
+<file path=ppt/slides/slide3.xml><?xml version="1.0" encoding="utf-8"?>
+<p:sld xmlns:a="http://schemas.openxmlformats.org/drawingml/2006/main" xmlns:r="http://schemas.openxmlformats.org/officeDocument/2006/relationships" xmlns:p="http://schemas.openxmlformats.org/presentationml/2006/main">
+  <p:cSld>
+    <p:spTree>
+      <p:nvGrpSpPr>
+        <p:cNvPr id="1" name=""/>
+        <p:cNvGrpSpPr/>
+        <p:nvPr/>
+      </p:nvGrpSpPr>
+      <p:grpSpPr>
+        <a:xfrm>
+          <a:off x="0" y="0"/>
+          <a:ext cx="0" cy="0"/>
+          <a:chOff x="0" y="0"/>
+          <a:chExt cx="0" cy="0"/>
+        </a:xfrm>
+      </p:grpSpPr>
+      <p:sp>
+        <p:nvSpPr>
+          <p:cNvPr id="2" name="Title 1"/>
+          <p:cNvSpPr>
+            <a:spLocks noGrp="1"/>
+          </p:cNvSpPr>
+          <p:nvPr>
+            <p:ph type="title"/>
+          </p:nvPr>
+        </p:nvSpPr>
+        <p:spPr/>
+        <p:txBody>
+          <a:bodyPr/>
+          <a:lstStyle/>
+          <a:p>
+            <a:r>
+              <a:rPr lang="en-GB" dirty="0"/>
+              <a:t>L</a:t>
+            </a:r>
+            <a:r>
+              <a:rPr lang="en-GB" dirty="0" smtClean="0"/>
+              <a:t>ikelihood</a:t>
+            </a:r>
+            <a:endParaRPr lang="en-GB" dirty="0"/>
+          </a:p>
+        </p:txBody>
+      </p:sp>
+      <p:sp>
+        <p:nvSpPr>
+          <p:cNvPr id="3" name="Content Placeholder 2"/>
+          <p:cNvSpPr>
+            <a:spLocks noGrp="1"/>
+          </p:cNvSpPr>
+          <p:nvPr>
+            <p:ph idx="1"/>
+          </p:nvPr>
+        </p:nvSpPr>
+        <p:spPr/>
+        <p:txBody>
+          <a:bodyPr/>
+          <a:lstStyle/>
+          <a:p>
+            <a:r>
+              <a:rPr lang="en-GB" dirty="0" smtClean="0"/>
+              <a:t>First and most influential component of a Bayesian model is the likelihood</a:t>
+            </a:r>
+          </a:p>
+          <a:p>
+            <a:r>
+              <a:rPr lang="en-GB" dirty="0" smtClean="0"/>
+              <a:t>Specifies the plausibility of the data</a:t>
+            </a:r>
+          </a:p>
+          <a:p>
+            <a:r>
+              <a:rPr lang="en-GB" dirty="0" smtClean="0"/>
+              <a:t>Relies on assumptions. Ex: binomial distribution:</a:t>
+            </a:r>
+          </a:p>
+          <a:p>
+            <a:pPr lvl="1"/>
+            <a:r>
+              <a:rPr lang="en-GB" dirty="0" smtClean="0"/>
+              <a:t>Independence of trials</a:t>
+            </a:r>
+          </a:p>
+          <a:p>
+            <a:pPr lvl="1"/>
+            <a:r>
+              <a:rPr lang="en-GB" dirty="0" smtClean="0"/>
+              <a:t>Probability of success is identical for each trial</a:t>
+            </a:r>
+          </a:p>
+          <a:p>
+            <a:r>
+              <a:rPr lang="en-GB" dirty="0" smtClean="0"/>
+              <a:t>Major assumptions in both Bayesian (and non-Bayesian) models are the likelihood function and their relations to the parameters</a:t>
+            </a:r>
+          </a:p>
+          <a:p>
+            <a:r>
+              <a:rPr lang="en-GB" dirty="0" smtClean="0"/>
+              <a:t>As sample size increases, the likelihood matters more and more</a:t>
+            </a:r>
+          </a:p>
+        </p:txBody>
+      </p:sp>
+      <p:sp>
+        <p:nvSpPr>
           <p:cNvPr id="4" name="Footer Placeholder 3"/>
           <p:cNvSpPr>
             <a:spLocks noGrp="1"/>
@@ -3846,7 +5352,79 @@
           <a:p>
             <a:fld id="{19D60E1B-DCEA-4626-AAA8-893A8BABE5ED}" type="slidenum">
               <a:rPr lang="en-GB" smtClean="0"/>
-              <a:t>2</a:t>
+              <a:t>3</a:t>
+            </a:fld>
+            <a:endParaRPr lang="en-GB"/>
+          </a:p>
+        </p:txBody>
+      </p:sp>
+    </p:spTree>
+    <p:extLst>
+      <p:ext uri="{BB962C8B-B14F-4D97-AF65-F5344CB8AC3E}">
+        <p14:creationId xmlns:p14="http://schemas.microsoft.com/office/powerpoint/2010/main" val="3900070984"/>
+      </p:ext>
+    </p:extLst>
+  </p:cSld>
+  <p:clrMapOvr>
+    <a:masterClrMapping/>
+  </p:clrMapOvr>
+</p:sld>
+</file>
+
+<file path=ppt/slides/slide4.xml><?xml version="1.0" encoding="utf-8"?>
+<p:sld xmlns:a="http://schemas.openxmlformats.org/drawingml/2006/main" xmlns:r="http://schemas.openxmlformats.org/officeDocument/2006/relationships" xmlns:p="http://schemas.openxmlformats.org/presentationml/2006/main">
+  <p:cSld>
+    <p:spTree>
+      <p:nvGrpSpPr>
+        <p:cNvPr id="1" name=""/>
+        <p:cNvGrpSpPr/>
+        <p:nvPr/>
+      </p:nvGrpSpPr>
+      <p:grpSpPr>
+        <a:xfrm>
+          <a:off x="0" y="0"/>
+          <a:ext cx="0" cy="0"/>
+          <a:chOff x="0" y="0"/>
+          <a:chExt cx="0" cy="0"/>
+        </a:xfrm>
+      </p:grpSpPr>
+      <p:sp>
+        <p:nvSpPr>
+          <p:cNvPr id="4" name="Footer Placeholder 3"/>
+          <p:cNvSpPr>
+            <a:spLocks noGrp="1"/>
+          </p:cNvSpPr>
+          <p:nvPr>
+            <p:ph type="ftr" sz="quarter" idx="11"/>
+          </p:nvPr>
+        </p:nvSpPr>
+        <p:spPr/>
+        <p:txBody>
+          <a:bodyPr/>
+          <a:lstStyle/>
+          <a:p>
+            <a:endParaRPr lang="en-GB"/>
+          </a:p>
+        </p:txBody>
+      </p:sp>
+      <p:sp>
+        <p:nvSpPr>
+          <p:cNvPr id="5" name="Slide Number Placeholder 4"/>
+          <p:cNvSpPr>
+            <a:spLocks noGrp="1"/>
+          </p:cNvSpPr>
+          <p:nvPr>
+            <p:ph type="sldNum" sz="quarter" idx="12"/>
+          </p:nvPr>
+        </p:nvSpPr>
+        <p:spPr/>
+        <p:txBody>
+          <a:bodyPr/>
+          <a:lstStyle/>
+          <a:p>
+            <a:fld id="{19D60E1B-DCEA-4626-AAA8-893A8BABE5ED}" type="slidenum">
+              <a:rPr lang="en-GB" smtClean="0"/>
+              <a:t>4</a:t>
             </a:fld>
             <a:endParaRPr lang="en-GB"/>
           </a:p>
@@ -3906,7 +5484,7 @@
 </p:sld>
 </file>
 
-<file path=ppt/slides/slide3.xml><?xml version="1.0" encoding="utf-8"?>
+<file path=ppt/slides/slide5.xml><?xml version="1.0" encoding="utf-8"?>
 <p:sld xmlns:a="http://schemas.openxmlformats.org/drawingml/2006/main" xmlns:r="http://schemas.openxmlformats.org/officeDocument/2006/relationships" xmlns:p="http://schemas.openxmlformats.org/presentationml/2006/main">
   <p:cSld>
     <p:spTree>
@@ -3959,7 +5537,7 @@
           <a:p>
             <a:fld id="{19D60E1B-DCEA-4626-AAA8-893A8BABE5ED}" type="slidenum">
               <a:rPr lang="en-GB" smtClean="0"/>
-              <a:t>3</a:t>
+              <a:t>5</a:t>
             </a:fld>
             <a:endParaRPr lang="en-GB"/>
           </a:p>
@@ -4060,7 +5638,7 @@
 </p:sld>
 </file>
 
-<file path=ppt/slides/slide4.xml><?xml version="1.0" encoding="utf-8"?>
+<file path=ppt/slides/slide6.xml><?xml version="1.0" encoding="utf-8"?>
 <p:sld xmlns:a="http://schemas.openxmlformats.org/drawingml/2006/main" xmlns:r="http://schemas.openxmlformats.org/officeDocument/2006/relationships" xmlns:p="http://schemas.openxmlformats.org/presentationml/2006/main">
   <p:cSld>
     <p:spTree>
@@ -4113,7 +5691,7 @@
           <a:p>
             <a:fld id="{19D60E1B-DCEA-4626-AAA8-893A8BABE5ED}" type="slidenum">
               <a:rPr lang="en-GB" smtClean="0"/>
-              <a:t>4</a:t>
+              <a:t>6</a:t>
             </a:fld>
             <a:endParaRPr lang="en-GB"/>
           </a:p>
@@ -4214,7 +5792,415 @@
 </p:sld>
 </file>
 
-<file path=ppt/slides/slide5.xml><?xml version="1.0" encoding="utf-8"?>
+<file path=ppt/slides/slide7.xml><?xml version="1.0" encoding="utf-8"?>
+<p:sld xmlns:a="http://schemas.openxmlformats.org/drawingml/2006/main" xmlns:r="http://schemas.openxmlformats.org/officeDocument/2006/relationships" xmlns:p="http://schemas.openxmlformats.org/presentationml/2006/main">
+  <p:cSld>
+    <p:spTree>
+      <p:nvGrpSpPr>
+        <p:cNvPr id="1" name=""/>
+        <p:cNvGrpSpPr/>
+        <p:nvPr/>
+      </p:nvGrpSpPr>
+      <p:grpSpPr>
+        <a:xfrm>
+          <a:off x="0" y="0"/>
+          <a:ext cx="0" cy="0"/>
+          <a:chOff x="0" y="0"/>
+          <a:chExt cx="0" cy="0"/>
+        </a:xfrm>
+      </p:grpSpPr>
+      <p:sp>
+        <p:nvSpPr>
+          <p:cNvPr id="2" name="Title 1"/>
+          <p:cNvSpPr>
+            <a:spLocks noGrp="1"/>
+          </p:cNvSpPr>
+          <p:nvPr>
+            <p:ph type="title"/>
+          </p:nvPr>
+        </p:nvSpPr>
+        <p:spPr>
+          <a:xfrm>
+            <a:off x="520700" y="911225"/>
+            <a:ext cx="5753100" cy="1325563"/>
+          </a:xfrm>
+        </p:spPr>
+        <p:txBody>
+          <a:bodyPr>
+            <a:normAutofit fontScale="90000"/>
+          </a:bodyPr>
+          <a:lstStyle/>
+          <a:p>
+            <a:r>
+              <a:rPr lang="en-GB" dirty="0" smtClean="0"/>
+              <a:t>Posterior distribution is proportional to the likelihood multiplied by the prior</a:t>
+            </a:r>
+            <a:endParaRPr lang="en-GB" dirty="0"/>
+          </a:p>
+        </p:txBody>
+      </p:sp>
+      <p:sp>
+        <p:nvSpPr>
+          <p:cNvPr id="4" name="Footer Placeholder 3"/>
+          <p:cNvSpPr>
+            <a:spLocks noGrp="1"/>
+          </p:cNvSpPr>
+          <p:nvPr>
+            <p:ph type="ftr" sz="quarter" idx="11"/>
+          </p:nvPr>
+        </p:nvSpPr>
+        <p:spPr/>
+        <p:txBody>
+          <a:bodyPr/>
+          <a:lstStyle/>
+          <a:p>
+            <a:endParaRPr lang="en-GB"/>
+          </a:p>
+        </p:txBody>
+      </p:sp>
+      <p:sp>
+        <p:nvSpPr>
+          <p:cNvPr id="5" name="Slide Number Placeholder 4"/>
+          <p:cNvSpPr>
+            <a:spLocks noGrp="1"/>
+          </p:cNvSpPr>
+          <p:nvPr>
+            <p:ph type="sldNum" sz="quarter" idx="12"/>
+          </p:nvPr>
+        </p:nvSpPr>
+        <p:spPr/>
+        <p:txBody>
+          <a:bodyPr/>
+          <a:lstStyle/>
+          <a:p>
+            <a:fld id="{19D60E1B-DCEA-4626-AAA8-893A8BABE5ED}" type="slidenum">
+              <a:rPr lang="en-GB" smtClean="0"/>
+              <a:t>7</a:t>
+            </a:fld>
+            <a:endParaRPr lang="en-GB"/>
+          </a:p>
+        </p:txBody>
+      </p:sp>
+      <p:pic>
+        <p:nvPicPr>
+          <p:cNvPr id="6" name="Picture 5"/>
+          <p:cNvPicPr>
+            <a:picLocks noChangeAspect="1"/>
+          </p:cNvPicPr>
+          <p:nvPr/>
+        </p:nvPicPr>
+        <p:blipFill rotWithShape="1">
+          <a:blip r:embed="rId2" cstate="print">
+            <a:extLst>
+              <a:ext uri="{28A0092B-C50C-407E-A947-70E740481C1C}">
+                <a14:useLocalDpi xmlns:a14="http://schemas.microsoft.com/office/drawing/2010/main" val="0"/>
+              </a:ext>
+            </a:extLst>
+          </a:blip>
+          <a:srcRect l="18334"/>
+          <a:stretch/>
+        </p:blipFill>
+        <p:spPr>
+          <a:xfrm rot="5400000">
+            <a:off x="5890935" y="1208365"/>
+            <a:ext cx="6469614" cy="4456114"/>
+          </a:xfrm>
+          <a:prstGeom prst="rect">
+            <a:avLst/>
+          </a:prstGeom>
+        </p:spPr>
+      </p:pic>
+      <p:sp>
+        <p:nvSpPr>
+          <p:cNvPr id="7" name="TextBox 6"/>
+          <p:cNvSpPr txBox="1"/>
+          <p:nvPr/>
+        </p:nvSpPr>
+        <p:spPr>
+          <a:xfrm>
+            <a:off x="1028700" y="3213100"/>
+            <a:ext cx="5096780" cy="2585323"/>
+          </a:xfrm>
+          <a:prstGeom prst="rect">
+            <a:avLst/>
+          </a:prstGeom>
+          <a:noFill/>
+        </p:spPr>
+        <p:txBody>
+          <a:bodyPr wrap="none" rtlCol="0">
+            <a:spAutoFit/>
+          </a:bodyPr>
+          <a:lstStyle/>
+          <a:p>
+            <a:r>
+              <a:rPr lang="en-GB" dirty="0" smtClean="0"/>
+              <a:t>Producing the posterior can be viewed as</a:t>
+            </a:r>
+          </a:p>
+          <a:p>
+            <a:r>
+              <a:rPr lang="en-GB" dirty="0" smtClean="0"/>
+              <a:t>Conditioning the prior on the data.</a:t>
+            </a:r>
+          </a:p>
+          <a:p>
+            <a:endParaRPr lang="en-GB" dirty="0"/>
+          </a:p>
+          <a:p>
+            <a:r>
+              <a:rPr lang="en-GB" dirty="0" smtClean="0"/>
+              <a:t>Posterior: usually impossible to compute analytically</a:t>
+            </a:r>
+          </a:p>
+          <a:p>
+            <a:r>
+              <a:rPr lang="en-GB" dirty="0" smtClean="0"/>
+              <a:t>Numerical techniques used to compute it:</a:t>
+            </a:r>
+          </a:p>
+          <a:p>
+            <a:pPr marL="285750" indent="-285750">
+              <a:buFontTx/>
+              <a:buChar char="-"/>
+            </a:pPr>
+            <a:r>
+              <a:rPr lang="en-GB" dirty="0" smtClean="0"/>
+              <a:t>Grid approximation</a:t>
+            </a:r>
+          </a:p>
+          <a:p>
+            <a:pPr marL="285750" indent="-285750">
+              <a:buFontTx/>
+              <a:buChar char="-"/>
+            </a:pPr>
+            <a:r>
+              <a:rPr lang="en-GB" dirty="0" smtClean="0"/>
+              <a:t>Quadratic approximation</a:t>
+            </a:r>
+          </a:p>
+          <a:p>
+            <a:pPr marL="285750" indent="-285750">
+              <a:buFontTx/>
+              <a:buChar char="-"/>
+            </a:pPr>
+            <a:r>
+              <a:rPr lang="en-GB" dirty="0" smtClean="0"/>
+              <a:t>MCMC</a:t>
+            </a:r>
+          </a:p>
+          <a:p>
+            <a:pPr marL="285750" indent="-285750">
+              <a:buFontTx/>
+              <a:buChar char="-"/>
+            </a:pPr>
+            <a:r>
+              <a:rPr lang="en-GB" dirty="0" smtClean="0"/>
+              <a:t>…</a:t>
+            </a:r>
+            <a:endParaRPr lang="en-GB" dirty="0"/>
+          </a:p>
+        </p:txBody>
+      </p:sp>
+    </p:spTree>
+    <p:extLst>
+      <p:ext uri="{BB962C8B-B14F-4D97-AF65-F5344CB8AC3E}">
+        <p14:creationId xmlns:p14="http://schemas.microsoft.com/office/powerpoint/2010/main" val="24062066"/>
+      </p:ext>
+    </p:extLst>
+  </p:cSld>
+  <p:clrMapOvr>
+    <a:masterClrMapping/>
+  </p:clrMapOvr>
+</p:sld>
+</file>
+
+<file path=ppt/slides/slide8.xml><?xml version="1.0" encoding="utf-8"?>
+<p:sld xmlns:a="http://schemas.openxmlformats.org/drawingml/2006/main" xmlns:r="http://schemas.openxmlformats.org/officeDocument/2006/relationships" xmlns:p="http://schemas.openxmlformats.org/presentationml/2006/main">
+  <p:cSld>
+    <p:spTree>
+      <p:nvGrpSpPr>
+        <p:cNvPr id="1" name=""/>
+        <p:cNvGrpSpPr/>
+        <p:nvPr/>
+      </p:nvGrpSpPr>
+      <p:grpSpPr>
+        <a:xfrm>
+          <a:off x="0" y="0"/>
+          <a:ext cx="0" cy="0"/>
+          <a:chOff x="0" y="0"/>
+          <a:chExt cx="0" cy="0"/>
+        </a:xfrm>
+      </p:grpSpPr>
+      <p:sp>
+        <p:nvSpPr>
+          <p:cNvPr id="2" name="Title 1"/>
+          <p:cNvSpPr>
+            <a:spLocks noGrp="1"/>
+          </p:cNvSpPr>
+          <p:nvPr>
+            <p:ph type="title"/>
+          </p:nvPr>
+        </p:nvSpPr>
+        <p:spPr/>
+        <p:txBody>
+          <a:bodyPr/>
+          <a:lstStyle/>
+          <a:p>
+            <a:r>
+              <a:rPr lang="en-GB" dirty="0" smtClean="0"/>
+              <a:t>Grid approximation</a:t>
+            </a:r>
+            <a:endParaRPr lang="en-GB" dirty="0"/>
+          </a:p>
+        </p:txBody>
+      </p:sp>
+      <p:sp>
+        <p:nvSpPr>
+          <p:cNvPr id="3" name="Content Placeholder 2"/>
+          <p:cNvSpPr>
+            <a:spLocks noGrp="1"/>
+          </p:cNvSpPr>
+          <p:nvPr>
+            <p:ph idx="1"/>
+          </p:nvPr>
+        </p:nvSpPr>
+        <p:spPr/>
+        <p:txBody>
+          <a:bodyPr>
+            <a:normAutofit fontScale="85000" lnSpcReduction="20000"/>
+          </a:bodyPr>
+          <a:lstStyle/>
+          <a:p>
+            <a:pPr marL="0" indent="0">
+              <a:buNone/>
+            </a:pPr>
+            <a:r>
+              <a:rPr lang="en-GB" dirty="0" smtClean="0"/>
+              <a:t>Approximation of a continuous posterior distribution by considering a finite grid of parameter values</a:t>
+            </a:r>
+          </a:p>
+          <a:p>
+            <a:r>
+              <a:rPr lang="en-GB" dirty="0" smtClean="0"/>
+              <a:t>1. define number of grid points + make list of parameter values on the grid</a:t>
+            </a:r>
+          </a:p>
+          <a:p>
+            <a:r>
+              <a:rPr lang="en-GB" dirty="0" smtClean="0"/>
+              <a:t>2. compute the value of the prior at each parameter values on the grid</a:t>
+            </a:r>
+          </a:p>
+          <a:p>
+            <a:r>
+              <a:rPr lang="en-GB" dirty="0" smtClean="0"/>
+              <a:t>3. Compute the likelihood at each parameter value</a:t>
+            </a:r>
+          </a:p>
+          <a:p>
+            <a:r>
+              <a:rPr lang="en-GB" dirty="0" smtClean="0"/>
+              <a:t>4. Compute the (unstandardized) posterior at each parameter value by multiplying the prior by the likelihood.</a:t>
+            </a:r>
+          </a:p>
+          <a:p>
+            <a:pPr marL="0" indent="0">
+              <a:buNone/>
+            </a:pPr>
+            <a:endParaRPr lang="en-GB" dirty="0" smtClean="0"/>
+          </a:p>
+          <a:p>
+            <a:pPr marL="0" indent="0">
+              <a:buNone/>
+            </a:pPr>
+            <a:r>
+              <a:rPr lang="en-GB" dirty="0" smtClean="0"/>
+              <a:t>Repeat (2-4) for each value in the grid</a:t>
+            </a:r>
+          </a:p>
+          <a:p>
+            <a:pPr marL="0" indent="0">
+              <a:buNone/>
+            </a:pPr>
+            <a:r>
+              <a:rPr lang="en-GB" dirty="0" smtClean="0"/>
+              <a:t>→This generates an approximation of the exact posterior distribution</a:t>
+            </a:r>
+          </a:p>
+          <a:p>
+            <a:pPr marL="0" indent="0">
+              <a:buNone/>
+            </a:pPr>
+            <a:endParaRPr lang="en-GB" dirty="0" smtClean="0"/>
+          </a:p>
+          <a:p>
+            <a:pPr marL="0" indent="0">
+              <a:buNone/>
+            </a:pPr>
+            <a:r>
+              <a:rPr lang="en-GB" dirty="0" smtClean="0"/>
+              <a:t>(Not used in practice but showed here to illustrate Bayesian updating)</a:t>
+            </a:r>
+            <a:endParaRPr lang="en-GB" dirty="0"/>
+          </a:p>
+        </p:txBody>
+      </p:sp>
+      <p:sp>
+        <p:nvSpPr>
+          <p:cNvPr id="4" name="Footer Placeholder 3"/>
+          <p:cNvSpPr>
+            <a:spLocks noGrp="1"/>
+          </p:cNvSpPr>
+          <p:nvPr>
+            <p:ph type="ftr" sz="quarter" idx="11"/>
+          </p:nvPr>
+        </p:nvSpPr>
+        <p:spPr/>
+        <p:txBody>
+          <a:bodyPr/>
+          <a:lstStyle/>
+          <a:p>
+            <a:endParaRPr lang="en-GB"/>
+          </a:p>
+        </p:txBody>
+      </p:sp>
+      <p:sp>
+        <p:nvSpPr>
+          <p:cNvPr id="5" name="Slide Number Placeholder 4"/>
+          <p:cNvSpPr>
+            <a:spLocks noGrp="1"/>
+          </p:cNvSpPr>
+          <p:nvPr>
+            <p:ph type="sldNum" sz="quarter" idx="12"/>
+          </p:nvPr>
+        </p:nvSpPr>
+        <p:spPr/>
+        <p:txBody>
+          <a:bodyPr/>
+          <a:lstStyle/>
+          <a:p>
+            <a:fld id="{19D60E1B-DCEA-4626-AAA8-893A8BABE5ED}" type="slidenum">
+              <a:rPr lang="en-GB" smtClean="0"/>
+              <a:t>8</a:t>
+            </a:fld>
+            <a:endParaRPr lang="en-GB"/>
+          </a:p>
+        </p:txBody>
+      </p:sp>
+    </p:spTree>
+    <p:extLst>
+      <p:ext uri="{BB962C8B-B14F-4D97-AF65-F5344CB8AC3E}">
+        <p14:creationId xmlns:p14="http://schemas.microsoft.com/office/powerpoint/2010/main" val="1564220582"/>
+      </p:ext>
+    </p:extLst>
+  </p:cSld>
+  <p:clrMapOvr>
+    <a:masterClrMapping/>
+  </p:clrMapOvr>
+</p:sld>
+</file>
+
+<file path=ppt/slides/slide9.xml><?xml version="1.0" encoding="utf-8"?>
 <p:sld xmlns:a="http://schemas.openxmlformats.org/drawingml/2006/main" xmlns:r="http://schemas.openxmlformats.org/officeDocument/2006/relationships" xmlns:p="http://schemas.openxmlformats.org/presentationml/2006/main">
   <p:cSld>
     <p:bg>
@@ -4360,7 +6346,7 @@
                   <a:schemeClr val="bg1"/>
                 </a:solidFill>
               </a:rPr>
-              <a:t>5</a:t>
+              <a:t>9</a:t>
             </a:fld>
             <a:endParaRPr lang="en-GB">
               <a:solidFill>
@@ -4643,607 +6629,6 @@
     <p:extLst>
       <p:ext uri="{BB962C8B-B14F-4D97-AF65-F5344CB8AC3E}">
         <p14:creationId xmlns:p14="http://schemas.microsoft.com/office/powerpoint/2010/main" val="2119963114"/>
-      </p:ext>
-    </p:extLst>
-  </p:cSld>
-  <p:clrMapOvr>
-    <a:masterClrMapping/>
-  </p:clrMapOvr>
-  <p:timing>
-    <p:tnLst>
-      <p:par>
-        <p:cTn id="1" dur="indefinite" restart="never" nodeType="tmRoot"/>
-      </p:par>
-    </p:tnLst>
-  </p:timing>
-</p:sld>
-</file>
-
-<file path=ppt/slides/slide6.xml><?xml version="1.0" encoding="utf-8"?>
-<p:sld xmlns:a="http://schemas.openxmlformats.org/drawingml/2006/main" xmlns:r="http://schemas.openxmlformats.org/officeDocument/2006/relationships" xmlns:p="http://schemas.openxmlformats.org/presentationml/2006/main">
-  <p:cSld>
-    <p:spTree>
-      <p:nvGrpSpPr>
-        <p:cNvPr id="1" name=""/>
-        <p:cNvGrpSpPr/>
-        <p:nvPr/>
-      </p:nvGrpSpPr>
-      <p:grpSpPr>
-        <a:xfrm>
-          <a:off x="0" y="0"/>
-          <a:ext cx="0" cy="0"/>
-          <a:chOff x="0" y="0"/>
-          <a:chExt cx="0" cy="0"/>
-        </a:xfrm>
-      </p:grpSpPr>
-      <p:sp>
-        <p:nvSpPr>
-          <p:cNvPr id="4" name="Footer Placeholder 3"/>
-          <p:cNvSpPr>
-            <a:spLocks noGrp="1"/>
-          </p:cNvSpPr>
-          <p:nvPr>
-            <p:ph type="ftr" sz="quarter" idx="11"/>
-          </p:nvPr>
-        </p:nvSpPr>
-        <p:spPr/>
-        <p:txBody>
-          <a:bodyPr/>
-          <a:lstStyle/>
-          <a:p>
-            <a:endParaRPr lang="en-GB"/>
-          </a:p>
-        </p:txBody>
-      </p:sp>
-      <p:sp>
-        <p:nvSpPr>
-          <p:cNvPr id="5" name="Slide Number Placeholder 4"/>
-          <p:cNvSpPr>
-            <a:spLocks noGrp="1"/>
-          </p:cNvSpPr>
-          <p:nvPr>
-            <p:ph type="sldNum" sz="quarter" idx="12"/>
-          </p:nvPr>
-        </p:nvSpPr>
-        <p:spPr/>
-        <p:txBody>
-          <a:bodyPr/>
-          <a:lstStyle/>
-          <a:p>
-            <a:fld id="{19D60E1B-DCEA-4626-AAA8-893A8BABE5ED}" type="slidenum">
-              <a:rPr lang="en-GB" smtClean="0"/>
-              <a:t>6</a:t>
-            </a:fld>
-            <a:endParaRPr lang="en-GB"/>
-          </a:p>
-        </p:txBody>
-      </p:sp>
-      <p:pic>
-        <p:nvPicPr>
-          <p:cNvPr id="2052" name="Picture 4" descr="Binomial Distribution Formula"/>
-          <p:cNvPicPr>
-            <a:picLocks noChangeAspect="1" noChangeArrowheads="1"/>
-          </p:cNvPicPr>
-          <p:nvPr/>
-        </p:nvPicPr>
-        <p:blipFill>
-          <a:blip r:embed="rId2">
-            <a:extLst>
-              <a:ext uri="{28A0092B-C50C-407E-A947-70E740481C1C}">
-                <a14:useLocalDpi xmlns:a14="http://schemas.microsoft.com/office/drawing/2010/main" val="0"/>
-              </a:ext>
-            </a:extLst>
-          </a:blip>
-          <a:srcRect/>
-          <a:stretch>
-            <a:fillRect/>
-          </a:stretch>
-        </p:blipFill>
-        <p:spPr bwMode="auto">
-          <a:xfrm>
-            <a:off x="1410733" y="255163"/>
-            <a:ext cx="9370534" cy="6466312"/>
-          </a:xfrm>
-          <a:prstGeom prst="rect">
-            <a:avLst/>
-          </a:prstGeom>
-          <a:noFill/>
-          <a:extLst>
-            <a:ext uri="{909E8E84-426E-40DD-AFC4-6F175D3DCCD1}">
-              <a14:hiddenFill xmlns:a14="http://schemas.microsoft.com/office/drawing/2010/main">
-                <a:solidFill>
-                  <a:srgbClr val="FFFFFF"/>
-                </a:solidFill>
-              </a14:hiddenFill>
-            </a:ext>
-          </a:extLst>
-        </p:spPr>
-      </p:pic>
-      <p:sp>
-        <p:nvSpPr>
-          <p:cNvPr id="8" name="TextBox 7"/>
-          <p:cNvSpPr txBox="1"/>
-          <p:nvPr/>
-        </p:nvSpPr>
-        <p:spPr>
-          <a:xfrm>
-            <a:off x="8953500" y="5353050"/>
-            <a:ext cx="1561005" cy="369332"/>
-          </a:xfrm>
-          <a:prstGeom prst="rect">
-            <a:avLst/>
-          </a:prstGeom>
-          <a:solidFill>
-            <a:schemeClr val="accent2"/>
-          </a:solidFill>
-        </p:spPr>
-        <p:txBody>
-          <a:bodyPr wrap="none" rtlCol="0">
-            <a:spAutoFit/>
-          </a:bodyPr>
-          <a:lstStyle/>
-          <a:p>
-            <a:r>
-              <a:rPr lang="en-GB" dirty="0" err="1" smtClean="0"/>
-              <a:t>Prob</a:t>
-            </a:r>
-            <a:r>
-              <a:rPr lang="en-GB" dirty="0" smtClean="0"/>
-              <a:t> (“water”)</a:t>
-            </a:r>
-            <a:endParaRPr lang="en-GB" dirty="0"/>
-          </a:p>
-        </p:txBody>
-      </p:sp>
-      <p:sp>
-        <p:nvSpPr>
-          <p:cNvPr id="11" name="TextBox 10"/>
-          <p:cNvSpPr txBox="1"/>
-          <p:nvPr/>
-        </p:nvSpPr>
-        <p:spPr>
-          <a:xfrm>
-            <a:off x="7318020" y="4908034"/>
-            <a:ext cx="4831964" cy="369332"/>
-          </a:xfrm>
-          <a:prstGeom prst="rect">
-            <a:avLst/>
-          </a:prstGeom>
-          <a:solidFill>
-            <a:schemeClr val="accent2"/>
-          </a:solidFill>
-        </p:spPr>
-        <p:txBody>
-          <a:bodyPr wrap="none" rtlCol="0">
-            <a:spAutoFit/>
-          </a:bodyPr>
-          <a:lstStyle/>
-          <a:p>
-            <a:r>
-              <a:rPr lang="en-GB" dirty="0" smtClean="0"/>
-              <a:t>Count of (“water”) follows a Binomial distribution</a:t>
-            </a:r>
-            <a:endParaRPr lang="en-GB" dirty="0"/>
-          </a:p>
-        </p:txBody>
-      </p:sp>
-      <p:sp>
-        <p:nvSpPr>
-          <p:cNvPr id="12" name="TextBox 11"/>
-          <p:cNvSpPr txBox="1"/>
-          <p:nvPr/>
-        </p:nvSpPr>
-        <p:spPr>
-          <a:xfrm>
-            <a:off x="10388151" y="4441567"/>
-            <a:ext cx="1591461" cy="369332"/>
-          </a:xfrm>
-          <a:prstGeom prst="rect">
-            <a:avLst/>
-          </a:prstGeom>
-          <a:solidFill>
-            <a:schemeClr val="accent2"/>
-          </a:solidFill>
-        </p:spPr>
-        <p:txBody>
-          <a:bodyPr wrap="none" rtlCol="0">
-            <a:spAutoFit/>
-          </a:bodyPr>
-          <a:lstStyle/>
-          <a:p>
-            <a:r>
-              <a:rPr lang="en-GB" dirty="0" smtClean="0"/>
-              <a:t>Number tosses</a:t>
-            </a:r>
-            <a:endParaRPr lang="en-GB" dirty="0"/>
-          </a:p>
-        </p:txBody>
-      </p:sp>
-      <p:sp>
-        <p:nvSpPr>
-          <p:cNvPr id="13" name="TextBox 12"/>
-          <p:cNvSpPr txBox="1"/>
-          <p:nvPr/>
-        </p:nvSpPr>
-        <p:spPr>
-          <a:xfrm>
-            <a:off x="10456253" y="5835650"/>
-            <a:ext cx="1416863" cy="369332"/>
-          </a:xfrm>
-          <a:prstGeom prst="rect">
-            <a:avLst/>
-          </a:prstGeom>
-          <a:solidFill>
-            <a:schemeClr val="accent2"/>
-          </a:solidFill>
-        </p:spPr>
-        <p:txBody>
-          <a:bodyPr wrap="none" rtlCol="0">
-            <a:spAutoFit/>
-          </a:bodyPr>
-          <a:lstStyle/>
-          <a:p>
-            <a:r>
-              <a:rPr lang="en-GB" dirty="0" err="1" smtClean="0"/>
-              <a:t>Prob</a:t>
-            </a:r>
-            <a:r>
-              <a:rPr lang="en-GB" dirty="0" smtClean="0"/>
-              <a:t> (“land”)</a:t>
-            </a:r>
-            <a:endParaRPr lang="en-GB" dirty="0"/>
-          </a:p>
-        </p:txBody>
-      </p:sp>
-    </p:spTree>
-    <p:extLst>
-      <p:ext uri="{BB962C8B-B14F-4D97-AF65-F5344CB8AC3E}">
-        <p14:creationId xmlns:p14="http://schemas.microsoft.com/office/powerpoint/2010/main" val="1061651623"/>
-      </p:ext>
-    </p:extLst>
-  </p:cSld>
-  <p:clrMapOvr>
-    <a:masterClrMapping/>
-  </p:clrMapOvr>
-</p:sld>
-</file>
-
-<file path=ppt/slides/slide7.xml><?xml version="1.0" encoding="utf-8"?>
-<p:sld xmlns:a="http://schemas.openxmlformats.org/drawingml/2006/main" xmlns:r="http://schemas.openxmlformats.org/officeDocument/2006/relationships" xmlns:p="http://schemas.openxmlformats.org/presentationml/2006/main">
-  <p:cSld>
-    <p:spTree>
-      <p:nvGrpSpPr>
-        <p:cNvPr id="1" name=""/>
-        <p:cNvGrpSpPr/>
-        <p:nvPr/>
-      </p:nvGrpSpPr>
-      <p:grpSpPr>
-        <a:xfrm>
-          <a:off x="0" y="0"/>
-          <a:ext cx="0" cy="0"/>
-          <a:chOff x="0" y="0"/>
-          <a:chExt cx="0" cy="0"/>
-        </a:xfrm>
-      </p:grpSpPr>
-      <p:sp>
-        <p:nvSpPr>
-          <p:cNvPr id="4" name="Footer Placeholder 3"/>
-          <p:cNvSpPr>
-            <a:spLocks noGrp="1"/>
-          </p:cNvSpPr>
-          <p:nvPr>
-            <p:ph type="ftr" sz="quarter" idx="11"/>
-          </p:nvPr>
-        </p:nvSpPr>
-        <p:spPr/>
-        <p:txBody>
-          <a:bodyPr/>
-          <a:lstStyle/>
-          <a:p>
-            <a:endParaRPr lang="en-GB"/>
-          </a:p>
-        </p:txBody>
-      </p:sp>
-      <p:sp>
-        <p:nvSpPr>
-          <p:cNvPr id="5" name="Slide Number Placeholder 4"/>
-          <p:cNvSpPr>
-            <a:spLocks noGrp="1"/>
-          </p:cNvSpPr>
-          <p:nvPr>
-            <p:ph type="sldNum" sz="quarter" idx="12"/>
-          </p:nvPr>
-        </p:nvSpPr>
-        <p:spPr/>
-        <p:txBody>
-          <a:bodyPr/>
-          <a:lstStyle/>
-          <a:p>
-            <a:fld id="{19D60E1B-DCEA-4626-AAA8-893A8BABE5ED}" type="slidenum">
-              <a:rPr lang="en-GB" smtClean="0"/>
-              <a:t>7</a:t>
-            </a:fld>
-            <a:endParaRPr lang="en-GB"/>
-          </a:p>
-        </p:txBody>
-      </p:sp>
-      <p:pic>
-        <p:nvPicPr>
-          <p:cNvPr id="7" name="Picture 6"/>
-          <p:cNvPicPr>
-            <a:picLocks noChangeAspect="1"/>
-          </p:cNvPicPr>
-          <p:nvPr/>
-        </p:nvPicPr>
-        <p:blipFill rotWithShape="1">
-          <a:blip r:embed="rId2">
-            <a:extLst>
-              <a:ext uri="{BEBA8EAE-BF5A-486C-A8C5-ECC9F3942E4B}">
-                <a14:imgProps xmlns:a14="http://schemas.microsoft.com/office/drawing/2010/main">
-                  <a14:imgLayer r:embed="rId3">
-                    <a14:imgEffect>
-                      <a14:brightnessContrast bright="20000" contrast="-20000"/>
-                    </a14:imgEffect>
-                  </a14:imgLayer>
-                </a14:imgProps>
-              </a:ext>
-            </a:extLst>
-          </a:blip>
-          <a:srcRect l="47579"/>
-          <a:stretch/>
-        </p:blipFill>
-        <p:spPr>
-          <a:xfrm rot="16200000">
-            <a:off x="2334211" y="-1469981"/>
-            <a:ext cx="6825707" cy="9765670"/>
-          </a:xfrm>
-          <a:prstGeom prst="rect">
-            <a:avLst/>
-          </a:prstGeom>
-        </p:spPr>
-      </p:pic>
-    </p:spTree>
-    <p:extLst>
-      <p:ext uri="{BB962C8B-B14F-4D97-AF65-F5344CB8AC3E}">
-        <p14:creationId xmlns:p14="http://schemas.microsoft.com/office/powerpoint/2010/main" val="621405158"/>
-      </p:ext>
-    </p:extLst>
-  </p:cSld>
-  <p:clrMapOvr>
-    <a:masterClrMapping/>
-  </p:clrMapOvr>
-  <p:timing>
-    <p:tnLst>
-      <p:par>
-        <p:cTn id="1" dur="indefinite" restart="never" nodeType="tmRoot"/>
-      </p:par>
-    </p:tnLst>
-  </p:timing>
-</p:sld>
-</file>
-
-<file path=ppt/slides/slide8.xml><?xml version="1.0" encoding="utf-8"?>
-<p:sld xmlns:a="http://schemas.openxmlformats.org/drawingml/2006/main" xmlns:r="http://schemas.openxmlformats.org/officeDocument/2006/relationships" xmlns:p="http://schemas.openxmlformats.org/presentationml/2006/main">
-  <p:cSld>
-    <p:spTree>
-      <p:nvGrpSpPr>
-        <p:cNvPr id="1" name=""/>
-        <p:cNvGrpSpPr/>
-        <p:nvPr/>
-      </p:nvGrpSpPr>
-      <p:grpSpPr>
-        <a:xfrm>
-          <a:off x="0" y="0"/>
-          <a:ext cx="0" cy="0"/>
-          <a:chOff x="0" y="0"/>
-          <a:chExt cx="0" cy="0"/>
-        </a:xfrm>
-      </p:grpSpPr>
-      <p:sp>
-        <p:nvSpPr>
-          <p:cNvPr id="4" name="Footer Placeholder 3"/>
-          <p:cNvSpPr>
-            <a:spLocks noGrp="1"/>
-          </p:cNvSpPr>
-          <p:nvPr>
-            <p:ph type="ftr" sz="quarter" idx="11"/>
-          </p:nvPr>
-        </p:nvSpPr>
-        <p:spPr/>
-        <p:txBody>
-          <a:bodyPr/>
-          <a:lstStyle/>
-          <a:p>
-            <a:endParaRPr lang="en-GB"/>
-          </a:p>
-        </p:txBody>
-      </p:sp>
-      <p:sp>
-        <p:nvSpPr>
-          <p:cNvPr id="5" name="Slide Number Placeholder 4"/>
-          <p:cNvSpPr>
-            <a:spLocks noGrp="1"/>
-          </p:cNvSpPr>
-          <p:nvPr>
-            <p:ph type="sldNum" sz="quarter" idx="12"/>
-          </p:nvPr>
-        </p:nvSpPr>
-        <p:spPr/>
-        <p:txBody>
-          <a:bodyPr/>
-          <a:lstStyle/>
-          <a:p>
-            <a:fld id="{19D60E1B-DCEA-4626-AAA8-893A8BABE5ED}" type="slidenum">
-              <a:rPr lang="en-GB" smtClean="0"/>
-              <a:t>8</a:t>
-            </a:fld>
-            <a:endParaRPr lang="en-GB"/>
-          </a:p>
-        </p:txBody>
-      </p:sp>
-      <p:pic>
-        <p:nvPicPr>
-          <p:cNvPr id="6" name="Picture 5"/>
-          <p:cNvPicPr>
-            <a:picLocks noChangeAspect="1"/>
-          </p:cNvPicPr>
-          <p:nvPr/>
-        </p:nvPicPr>
-        <p:blipFill rotWithShape="1">
-          <a:blip r:embed="rId2">
-            <a:extLst>
-              <a:ext uri="{BEBA8EAE-BF5A-486C-A8C5-ECC9F3942E4B}">
-                <a14:imgProps xmlns:a14="http://schemas.microsoft.com/office/drawing/2010/main">
-                  <a14:imgLayer r:embed="rId3">
-                    <a14:imgEffect>
-                      <a14:brightnessContrast bright="20000" contrast="-20000"/>
-                    </a14:imgEffect>
-                  </a14:imgLayer>
-                </a14:imgProps>
-              </a:ext>
-            </a:extLst>
-          </a:blip>
-          <a:srcRect r="52421"/>
-          <a:stretch/>
-        </p:blipFill>
-        <p:spPr>
-          <a:xfrm rot="16200000">
-            <a:off x="2442384" y="-1794500"/>
-            <a:ext cx="6666510" cy="10508622"/>
-          </a:xfrm>
-          <a:prstGeom prst="rect">
-            <a:avLst/>
-          </a:prstGeom>
-        </p:spPr>
-      </p:pic>
-    </p:spTree>
-    <p:extLst>
-      <p:ext uri="{BB962C8B-B14F-4D97-AF65-F5344CB8AC3E}">
-        <p14:creationId xmlns:p14="http://schemas.microsoft.com/office/powerpoint/2010/main" val="2608275580"/>
-      </p:ext>
-    </p:extLst>
-  </p:cSld>
-  <p:clrMapOvr>
-    <a:masterClrMapping/>
-  </p:clrMapOvr>
-</p:sld>
-</file>
-
-<file path=ppt/slides/slide9.xml><?xml version="1.0" encoding="utf-8"?>
-<p:sld xmlns:a="http://schemas.openxmlformats.org/drawingml/2006/main" xmlns:r="http://schemas.openxmlformats.org/officeDocument/2006/relationships" xmlns:p="http://schemas.openxmlformats.org/presentationml/2006/main">
-  <p:cSld>
-    <p:spTree>
-      <p:nvGrpSpPr>
-        <p:cNvPr id="1" name=""/>
-        <p:cNvGrpSpPr/>
-        <p:nvPr/>
-      </p:nvGrpSpPr>
-      <p:grpSpPr>
-        <a:xfrm>
-          <a:off x="0" y="0"/>
-          <a:ext cx="0" cy="0"/>
-          <a:chOff x="0" y="0"/>
-          <a:chExt cx="0" cy="0"/>
-        </a:xfrm>
-      </p:grpSpPr>
-      <p:sp>
-        <p:nvSpPr>
-          <p:cNvPr id="6" name="Title 5"/>
-          <p:cNvSpPr>
-            <a:spLocks noGrp="1"/>
-          </p:cNvSpPr>
-          <p:nvPr>
-            <p:ph type="title"/>
-          </p:nvPr>
-        </p:nvSpPr>
-        <p:spPr/>
-        <p:txBody>
-          <a:bodyPr/>
-          <a:lstStyle/>
-          <a:p>
-            <a:r>
-              <a:rPr lang="en-GB" dirty="0" smtClean="0"/>
-              <a:t>Practical</a:t>
-            </a:r>
-            <a:endParaRPr lang="en-GB" dirty="0"/>
-          </a:p>
-        </p:txBody>
-      </p:sp>
-      <p:sp>
-        <p:nvSpPr>
-          <p:cNvPr id="8" name="Content Placeholder 7"/>
-          <p:cNvSpPr>
-            <a:spLocks noGrp="1"/>
-          </p:cNvSpPr>
-          <p:nvPr>
-            <p:ph idx="1"/>
-          </p:nvPr>
-        </p:nvSpPr>
-        <p:spPr/>
-        <p:txBody>
-          <a:bodyPr/>
-          <a:lstStyle/>
-          <a:p>
-            <a:r>
-              <a:rPr lang="en-GB" dirty="0" smtClean="0"/>
-              <a:t>Start and complete the first R practical</a:t>
-            </a:r>
-          </a:p>
-          <a:p>
-            <a:pPr marL="0" indent="0">
-              <a:buNone/>
-            </a:pPr>
-            <a:endParaRPr lang="en-GB" dirty="0"/>
-          </a:p>
-        </p:txBody>
-      </p:sp>
-      <p:sp>
-        <p:nvSpPr>
-          <p:cNvPr id="4" name="Footer Placeholder 3"/>
-          <p:cNvSpPr>
-            <a:spLocks noGrp="1"/>
-          </p:cNvSpPr>
-          <p:nvPr>
-            <p:ph type="ftr" sz="quarter" idx="11"/>
-          </p:nvPr>
-        </p:nvSpPr>
-        <p:spPr/>
-        <p:txBody>
-          <a:bodyPr/>
-          <a:lstStyle/>
-          <a:p>
-            <a:endParaRPr lang="en-GB"/>
-          </a:p>
-        </p:txBody>
-      </p:sp>
-      <p:sp>
-        <p:nvSpPr>
-          <p:cNvPr id="5" name="Slide Number Placeholder 4"/>
-          <p:cNvSpPr>
-            <a:spLocks noGrp="1"/>
-          </p:cNvSpPr>
-          <p:nvPr>
-            <p:ph type="sldNum" sz="quarter" idx="12"/>
-          </p:nvPr>
-        </p:nvSpPr>
-        <p:spPr/>
-        <p:txBody>
-          <a:bodyPr/>
-          <a:lstStyle/>
-          <a:p>
-            <a:fld id="{19D60E1B-DCEA-4626-AAA8-893A8BABE5ED}" type="slidenum">
-              <a:rPr lang="en-GB" smtClean="0"/>
-              <a:pPr/>
-              <a:t>9</a:t>
-            </a:fld>
-            <a:endParaRPr lang="en-GB"/>
-          </a:p>
-        </p:txBody>
-      </p:sp>
-    </p:spTree>
-    <p:extLst>
-      <p:ext uri="{BB962C8B-B14F-4D97-AF65-F5344CB8AC3E}">
-        <p14:creationId xmlns:p14="http://schemas.microsoft.com/office/powerpoint/2010/main" val="1187946936"/>
       </p:ext>
     </p:extLst>
   </p:cSld>

</xml_diff>